<commit_message>
skończona prezentacja uzasadnienie biznesowe
prezentacja w wersji finalnej
</commit_message>
<xml_diff>
--- a/Dokumentacja/Uzasadnienie biznesowe/Uzasadnienie biznesowe.pptx
+++ b/Dokumentacja/Uzasadnienie biznesowe/Uzasadnienie biznesowe.pptx
@@ -5,24 +5,22 @@
     <p:sldMasterId id="2147483648" r:id="rId1"/>
   </p:sldMasterIdLst>
   <p:notesMasterIdLst>
-    <p:notesMasterId r:id="rId14"/>
+    <p:notesMasterId r:id="rId12"/>
   </p:notesMasterIdLst>
   <p:handoutMasterIdLst>
-    <p:handoutMasterId r:id="rId15"/>
+    <p:handoutMasterId r:id="rId13"/>
   </p:handoutMasterIdLst>
   <p:sldIdLst>
     <p:sldId id="257" r:id="rId2"/>
     <p:sldId id="258" r:id="rId3"/>
-    <p:sldId id="260" r:id="rId4"/>
-    <p:sldId id="261" r:id="rId5"/>
-    <p:sldId id="262" r:id="rId6"/>
-    <p:sldId id="263" r:id="rId7"/>
-    <p:sldId id="264" r:id="rId8"/>
-    <p:sldId id="265" r:id="rId9"/>
-    <p:sldId id="266" r:id="rId10"/>
-    <p:sldId id="267" r:id="rId11"/>
-    <p:sldId id="268" r:id="rId12"/>
-    <p:sldId id="269" r:id="rId13"/>
+    <p:sldId id="262" r:id="rId4"/>
+    <p:sldId id="264" r:id="rId5"/>
+    <p:sldId id="265" r:id="rId6"/>
+    <p:sldId id="267" r:id="rId7"/>
+    <p:sldId id="268" r:id="rId8"/>
+    <p:sldId id="269" r:id="rId9"/>
+    <p:sldId id="271" r:id="rId10"/>
+    <p:sldId id="270" r:id="rId11"/>
   </p:sldIdLst>
   <p:sldSz cx="12192000" cy="6858000"/>
   <p:notesSz cx="6858000" cy="9144000"/>
@@ -133,86 +131,68 @@
 </file>
 
 <file path=ppt/diagrams/colors1.xml><?xml version="1.0" encoding="utf-8"?>
-<dgm:colorsDef xmlns:dgm="http://schemas.openxmlformats.org/drawingml/2006/diagram" xmlns:a="http://schemas.openxmlformats.org/drawingml/2006/main" uniqueId="urn:microsoft.com/office/officeart/2005/8/colors/accent1_1">
+<dgm:colorsDef xmlns:dgm="http://schemas.openxmlformats.org/drawingml/2006/diagram" xmlns:a="http://schemas.openxmlformats.org/drawingml/2006/main" uniqueId="urn:microsoft.com/office/officeart/2005/8/colors/accent1_2">
   <dgm:title val=""/>
   <dgm:desc val=""/>
   <dgm:catLst>
-    <dgm:cat type="accent1" pri="11100"/>
+    <dgm:cat type="accent1" pri="11200"/>
   </dgm:catLst>
   <dgm:styleLbl name="node0">
     <dgm:fillClrLst meth="repeat">
-      <a:schemeClr val="lt1"/>
+      <a:schemeClr val="accent1"/>
     </dgm:fillClrLst>
     <dgm:linClrLst meth="repeat">
-      <a:schemeClr val="accent1">
-        <a:shade val="80000"/>
-      </a:schemeClr>
+      <a:schemeClr val="lt1"/>
     </dgm:linClrLst>
     <dgm:effectClrLst/>
     <dgm:txLinClrLst/>
-    <dgm:txFillClrLst meth="repeat">
-      <a:schemeClr val="dk1"/>
-    </dgm:txFillClrLst>
+    <dgm:txFillClrLst/>
     <dgm:txEffectClrLst/>
   </dgm:styleLbl>
   <dgm:styleLbl name="alignNode1">
     <dgm:fillClrLst meth="repeat">
-      <a:schemeClr val="lt1"/>
+      <a:schemeClr val="accent1"/>
     </dgm:fillClrLst>
     <dgm:linClrLst meth="repeat">
-      <a:schemeClr val="accent1">
-        <a:shade val="80000"/>
-      </a:schemeClr>
+      <a:schemeClr val="accent1"/>
     </dgm:linClrLst>
     <dgm:effectClrLst/>
     <dgm:txLinClrLst/>
-    <dgm:txFillClrLst meth="repeat">
-      <a:schemeClr val="dk1"/>
-    </dgm:txFillClrLst>
+    <dgm:txFillClrLst/>
     <dgm:txEffectClrLst/>
   </dgm:styleLbl>
   <dgm:styleLbl name="node1">
     <dgm:fillClrLst meth="repeat">
-      <a:schemeClr val="lt1"/>
+      <a:schemeClr val="accent1"/>
     </dgm:fillClrLst>
     <dgm:linClrLst meth="repeat">
-      <a:schemeClr val="accent1">
-        <a:shade val="80000"/>
-      </a:schemeClr>
+      <a:schemeClr val="lt1"/>
     </dgm:linClrLst>
     <dgm:effectClrLst/>
     <dgm:txLinClrLst/>
-    <dgm:txFillClrLst meth="repeat">
-      <a:schemeClr val="dk1"/>
-    </dgm:txFillClrLst>
+    <dgm:txFillClrLst/>
     <dgm:txEffectClrLst/>
   </dgm:styleLbl>
   <dgm:styleLbl name="lnNode1">
     <dgm:fillClrLst meth="repeat">
-      <a:schemeClr val="lt1"/>
+      <a:schemeClr val="accent1"/>
     </dgm:fillClrLst>
     <dgm:linClrLst meth="repeat">
-      <a:schemeClr val="accent1">
-        <a:shade val="80000"/>
-      </a:schemeClr>
+      <a:schemeClr val="lt1"/>
     </dgm:linClrLst>
     <dgm:effectClrLst/>
     <dgm:txLinClrLst/>
-    <dgm:txFillClrLst meth="repeat">
-      <a:schemeClr val="dk1"/>
-    </dgm:txFillClrLst>
+    <dgm:txFillClrLst/>
     <dgm:txEffectClrLst/>
   </dgm:styleLbl>
   <dgm:styleLbl name="vennNode1">
     <dgm:fillClrLst meth="repeat">
-      <a:schemeClr val="lt1">
+      <a:schemeClr val="accent1">
         <a:alpha val="50000"/>
       </a:schemeClr>
     </dgm:fillClrLst>
     <dgm:linClrLst meth="repeat">
-      <a:schemeClr val="accent1">
-        <a:shade val="80000"/>
-      </a:schemeClr>
+      <a:schemeClr val="lt1"/>
     </dgm:linClrLst>
     <dgm:effectClrLst/>
     <dgm:txLinClrLst/>
@@ -221,62 +201,48 @@
   </dgm:styleLbl>
   <dgm:styleLbl name="node2">
     <dgm:fillClrLst meth="repeat">
-      <a:schemeClr val="lt1"/>
+      <a:schemeClr val="accent1"/>
     </dgm:fillClrLst>
     <dgm:linClrLst meth="repeat">
-      <a:schemeClr val="accent1">
-        <a:shade val="80000"/>
-      </a:schemeClr>
+      <a:schemeClr val="lt1"/>
     </dgm:linClrLst>
     <dgm:effectClrLst/>
     <dgm:txLinClrLst/>
-    <dgm:txFillClrLst meth="repeat">
-      <a:schemeClr val="dk1"/>
-    </dgm:txFillClrLst>
+    <dgm:txFillClrLst/>
     <dgm:txEffectClrLst/>
   </dgm:styleLbl>
   <dgm:styleLbl name="node3">
     <dgm:fillClrLst meth="repeat">
-      <a:schemeClr val="lt1"/>
+      <a:schemeClr val="accent1"/>
     </dgm:fillClrLst>
     <dgm:linClrLst meth="repeat">
-      <a:schemeClr val="accent1">
-        <a:shade val="80000"/>
-      </a:schemeClr>
+      <a:schemeClr val="lt1"/>
     </dgm:linClrLst>
     <dgm:effectClrLst/>
     <dgm:txLinClrLst/>
-    <dgm:txFillClrLst meth="repeat">
-      <a:schemeClr val="dk1"/>
-    </dgm:txFillClrLst>
+    <dgm:txFillClrLst/>
     <dgm:txEffectClrLst/>
   </dgm:styleLbl>
   <dgm:styleLbl name="node4">
     <dgm:fillClrLst meth="repeat">
-      <a:schemeClr val="lt1"/>
+      <a:schemeClr val="accent1"/>
     </dgm:fillClrLst>
     <dgm:linClrLst meth="repeat">
-      <a:schemeClr val="accent1">
-        <a:shade val="80000"/>
-      </a:schemeClr>
+      <a:schemeClr val="lt1"/>
     </dgm:linClrLst>
     <dgm:effectClrLst/>
     <dgm:txLinClrLst/>
-    <dgm:txFillClrLst meth="repeat">
-      <a:schemeClr val="dk1"/>
-    </dgm:txFillClrLst>
+    <dgm:txFillClrLst/>
     <dgm:txEffectClrLst/>
   </dgm:styleLbl>
   <dgm:styleLbl name="fgImgPlace1">
     <dgm:fillClrLst meth="repeat">
       <a:schemeClr val="accent1">
-        <a:tint val="40000"/>
+        <a:tint val="50000"/>
       </a:schemeClr>
     </dgm:fillClrLst>
     <dgm:linClrLst meth="repeat">
-      <a:schemeClr val="accent1">
-        <a:shade val="80000"/>
-      </a:schemeClr>
+      <a:schemeClr val="lt1"/>
     </dgm:linClrLst>
     <dgm:effectClrLst/>
     <dgm:txLinClrLst/>
@@ -288,13 +254,11 @@
   <dgm:styleLbl name="alignImgPlace1">
     <dgm:fillClrLst meth="repeat">
       <a:schemeClr val="accent1">
-        <a:tint val="40000"/>
+        <a:tint val="50000"/>
       </a:schemeClr>
     </dgm:fillClrLst>
     <dgm:linClrLst meth="repeat">
-      <a:schemeClr val="accent1">
-        <a:shade val="80000"/>
-      </a:schemeClr>
+      <a:schemeClr val="lt1"/>
     </dgm:linClrLst>
     <dgm:effectClrLst/>
     <dgm:txLinClrLst/>
@@ -306,13 +270,11 @@
   <dgm:styleLbl name="bgImgPlace1">
     <dgm:fillClrLst meth="repeat">
       <a:schemeClr val="accent1">
-        <a:tint val="40000"/>
+        <a:tint val="50000"/>
       </a:schemeClr>
     </dgm:fillClrLst>
     <dgm:linClrLst meth="repeat">
-      <a:schemeClr val="accent1">
-        <a:shade val="80000"/>
-      </a:schemeClr>
+      <a:schemeClr val="lt1"/>
     </dgm:linClrLst>
     <dgm:effectClrLst/>
     <dgm:txLinClrLst/>
@@ -334,9 +296,7 @@
     </dgm:linClrLst>
     <dgm:effectClrLst/>
     <dgm:txLinClrLst/>
-    <dgm:txFillClrLst meth="repeat">
-      <a:schemeClr val="dk1"/>
-    </dgm:txFillClrLst>
+    <dgm:txFillClrLst/>
     <dgm:txEffectClrLst/>
   </dgm:styleLbl>
   <dgm:styleLbl name="fgSibTrans2D1">
@@ -352,9 +312,7 @@
     </dgm:linClrLst>
     <dgm:effectClrLst/>
     <dgm:txLinClrLst/>
-    <dgm:txFillClrLst meth="repeat">
-      <a:schemeClr val="dk1"/>
-    </dgm:txFillClrLst>
+    <dgm:txFillClrLst/>
     <dgm:txEffectClrLst/>
   </dgm:styleLbl>
   <dgm:styleLbl name="bgSibTrans2D1">
@@ -370,9 +328,7 @@
     </dgm:linClrLst>
     <dgm:effectClrLst/>
     <dgm:txLinClrLst/>
-    <dgm:txFillClrLst meth="repeat">
-      <a:schemeClr val="dk1"/>
-    </dgm:txFillClrLst>
+    <dgm:txFillClrLst/>
     <dgm:txEffectClrLst/>
   </dgm:styleLbl>
   <dgm:styleLbl name="sibTrans1D1">
@@ -394,7 +350,9 @@
       <a:schemeClr val="accent1"/>
     </dgm:fillClrLst>
     <dgm:linClrLst meth="repeat">
-      <a:schemeClr val="accent1"/>
+      <a:schemeClr val="accent1">
+        <a:tint val="50000"/>
+      </a:schemeClr>
     </dgm:linClrLst>
     <dgm:effectClrLst/>
     <dgm:txLinClrLst/>
@@ -405,82 +363,62 @@
   </dgm:styleLbl>
   <dgm:styleLbl name="asst0">
     <dgm:fillClrLst meth="repeat">
-      <a:schemeClr val="lt1"/>
+      <a:schemeClr val="accent1"/>
     </dgm:fillClrLst>
     <dgm:linClrLst meth="repeat">
-      <a:schemeClr val="accent1">
-        <a:shade val="80000"/>
-      </a:schemeClr>
+      <a:schemeClr val="lt1"/>
     </dgm:linClrLst>
     <dgm:effectClrLst/>
     <dgm:txLinClrLst/>
-    <dgm:txFillClrLst meth="repeat">
-      <a:schemeClr val="dk1"/>
-    </dgm:txFillClrLst>
+    <dgm:txFillClrLst/>
     <dgm:txEffectClrLst/>
   </dgm:styleLbl>
   <dgm:styleLbl name="asst1">
     <dgm:fillClrLst meth="repeat">
-      <a:schemeClr val="lt1"/>
+      <a:schemeClr val="accent1"/>
     </dgm:fillClrLst>
     <dgm:linClrLst meth="repeat">
-      <a:schemeClr val="accent1">
-        <a:shade val="80000"/>
-      </a:schemeClr>
+      <a:schemeClr val="lt1"/>
     </dgm:linClrLst>
     <dgm:effectClrLst/>
     <dgm:txLinClrLst/>
-    <dgm:txFillClrLst meth="repeat">
-      <a:schemeClr val="dk1"/>
-    </dgm:txFillClrLst>
+    <dgm:txFillClrLst/>
     <dgm:txEffectClrLst/>
   </dgm:styleLbl>
   <dgm:styleLbl name="asst2">
     <dgm:fillClrLst meth="repeat">
-      <a:schemeClr val="lt1"/>
+      <a:schemeClr val="accent1"/>
     </dgm:fillClrLst>
     <dgm:linClrLst meth="repeat">
-      <a:schemeClr val="accent1">
-        <a:shade val="80000"/>
-      </a:schemeClr>
+      <a:schemeClr val="lt1"/>
     </dgm:linClrLst>
     <dgm:effectClrLst/>
     <dgm:txLinClrLst/>
-    <dgm:txFillClrLst meth="repeat">
-      <a:schemeClr val="dk1"/>
-    </dgm:txFillClrLst>
+    <dgm:txFillClrLst/>
     <dgm:txEffectClrLst/>
   </dgm:styleLbl>
   <dgm:styleLbl name="asst3">
     <dgm:fillClrLst meth="repeat">
-      <a:schemeClr val="lt1"/>
+      <a:schemeClr val="accent1"/>
     </dgm:fillClrLst>
     <dgm:linClrLst meth="repeat">
-      <a:schemeClr val="accent1">
-        <a:shade val="80000"/>
-      </a:schemeClr>
+      <a:schemeClr val="lt1"/>
     </dgm:linClrLst>
     <dgm:effectClrLst/>
     <dgm:txLinClrLst/>
-    <dgm:txFillClrLst meth="repeat">
-      <a:schemeClr val="dk1"/>
-    </dgm:txFillClrLst>
+    <dgm:txFillClrLst/>
     <dgm:txEffectClrLst/>
   </dgm:styleLbl>
   <dgm:styleLbl name="asst4">
     <dgm:fillClrLst meth="repeat">
-      <a:schemeClr val="lt1"/>
+      <a:schemeClr val="accent1"/>
     </dgm:fillClrLst>
     <dgm:linClrLst meth="repeat">
-      <a:schemeClr val="accent1">
-        <a:shade val="80000"/>
-      </a:schemeClr>
+      <a:schemeClr val="lt1"/>
     </dgm:linClrLst>
     <dgm:effectClrLst/>
     <dgm:txLinClrLst/>
-    <dgm:txFillClrLst meth="repeat">
-      <a:schemeClr val="dk1"/>
-    </dgm:txFillClrLst>
+    <dgm:txFillClrLst/>
     <dgm:txEffectClrLst/>
   </dgm:styleLbl>
   <dgm:styleLbl name="parChTrans2D1">
@@ -496,7 +434,9 @@
     </dgm:linClrLst>
     <dgm:effectClrLst/>
     <dgm:txLinClrLst/>
-    <dgm:txFillClrLst/>
+    <dgm:txFillClrLst meth="repeat">
+      <a:schemeClr val="lt1"/>
+    </dgm:txFillClrLst>
     <dgm:txEffectClrLst/>
   </dgm:styleLbl>
   <dgm:styleLbl name="parChTrans2D2">
@@ -508,7 +448,9 @@
     </dgm:linClrLst>
     <dgm:effectClrLst/>
     <dgm:txLinClrLst/>
-    <dgm:txFillClrLst/>
+    <dgm:txFillClrLst meth="repeat">
+      <a:schemeClr val="lt1"/>
+    </dgm:txFillClrLst>
     <dgm:txEffectClrLst/>
   </dgm:styleLbl>
   <dgm:styleLbl name="parChTrans2D3">
@@ -520,7 +462,9 @@
     </dgm:linClrLst>
     <dgm:effectClrLst/>
     <dgm:txLinClrLst/>
-    <dgm:txFillClrLst/>
+    <dgm:txFillClrLst meth="repeat">
+      <a:schemeClr val="lt1"/>
+    </dgm:txFillClrLst>
     <dgm:txEffectClrLst/>
   </dgm:styleLbl>
   <dgm:styleLbl name="parChTrans2D4">
@@ -603,9 +547,8 @@
   </dgm:styleLbl>
   <dgm:styleLbl name="fgAcc1">
     <dgm:fillClrLst meth="repeat">
-      <a:schemeClr val="accent1">
+      <a:schemeClr val="lt1">
         <a:alpha val="90000"/>
-        <a:tint val="40000"/>
       </a:schemeClr>
     </dgm:fillClrLst>
     <dgm:linClrLst meth="repeat">
@@ -620,9 +563,8 @@
   </dgm:styleLbl>
   <dgm:styleLbl name="conFgAcc1">
     <dgm:fillClrLst meth="repeat">
-      <a:schemeClr val="accent1">
+      <a:schemeClr val="lt1">
         <a:alpha val="90000"/>
-        <a:tint val="40000"/>
       </a:schemeClr>
     </dgm:fillClrLst>
     <dgm:linClrLst meth="repeat">
@@ -637,9 +579,8 @@
   </dgm:styleLbl>
   <dgm:styleLbl name="alignAcc1">
     <dgm:fillClrLst meth="repeat">
-      <a:schemeClr val="accent1">
+      <a:schemeClr val="lt1">
         <a:alpha val="90000"/>
-        <a:tint val="40000"/>
       </a:schemeClr>
     </dgm:fillClrLst>
     <dgm:linClrLst meth="repeat">
@@ -654,9 +595,8 @@
   </dgm:styleLbl>
   <dgm:styleLbl name="trAlignAcc1">
     <dgm:fillClrLst meth="repeat">
-      <a:schemeClr val="accent1">
+      <a:schemeClr val="lt1">
         <a:alpha val="40000"/>
-        <a:tint val="40000"/>
       </a:schemeClr>
     </dgm:fillClrLst>
     <dgm:linClrLst meth="repeat">
@@ -671,9 +611,8 @@
   </dgm:styleLbl>
   <dgm:styleLbl name="bgAcc1">
     <dgm:fillClrLst meth="repeat">
-      <a:schemeClr val="accent1">
+      <a:schemeClr val="lt1">
         <a:alpha val="90000"/>
-        <a:tint val="40000"/>
       </a:schemeClr>
     </dgm:fillClrLst>
     <dgm:linClrLst meth="repeat">
@@ -730,7 +669,7 @@
   </dgm:styleLbl>
   <dgm:styleLbl name="fgAccFollowNode1">
     <dgm:fillClrLst meth="repeat">
-      <a:schemeClr val="lt1">
+      <a:schemeClr val="accent1">
         <a:alpha val="90000"/>
         <a:tint val="40000"/>
       </a:schemeClr>
@@ -738,6 +677,7 @@
     <dgm:linClrLst meth="repeat">
       <a:schemeClr val="accent1">
         <a:alpha val="90000"/>
+        <a:tint val="40000"/>
       </a:schemeClr>
     </dgm:linClrLst>
     <dgm:effectClrLst/>
@@ -749,7 +689,7 @@
   </dgm:styleLbl>
   <dgm:styleLbl name="alignAccFollowNode1">
     <dgm:fillClrLst meth="repeat">
-      <a:schemeClr val="lt1">
+      <a:schemeClr val="accent1">
         <a:alpha val="90000"/>
         <a:tint val="40000"/>
       </a:schemeClr>
@@ -757,6 +697,7 @@
     <dgm:linClrLst meth="repeat">
       <a:schemeClr val="accent1">
         <a:alpha val="90000"/>
+        <a:tint val="40000"/>
       </a:schemeClr>
     </dgm:linClrLst>
     <dgm:effectClrLst/>
@@ -768,7 +709,7 @@
   </dgm:styleLbl>
   <dgm:styleLbl name="bgAccFollowNode1">
     <dgm:fillClrLst meth="repeat">
-      <a:schemeClr val="lt1">
+      <a:schemeClr val="accent1">
         <a:alpha val="90000"/>
         <a:tint val="40000"/>
       </a:schemeClr>
@@ -776,6 +717,7 @@
     <dgm:linClrLst meth="repeat">
       <a:schemeClr val="accent1">
         <a:alpha val="90000"/>
+        <a:tint val="40000"/>
       </a:schemeClr>
     </dgm:linClrLst>
     <dgm:effectClrLst/>
@@ -787,9 +729,8 @@
   </dgm:styleLbl>
   <dgm:styleLbl name="fgAcc0">
     <dgm:fillClrLst meth="repeat">
-      <a:schemeClr val="accent1">
+      <a:schemeClr val="lt1">
         <a:alpha val="90000"/>
-        <a:tint val="40000"/>
       </a:schemeClr>
     </dgm:fillClrLst>
     <dgm:linClrLst meth="repeat">
@@ -804,9 +745,8 @@
   </dgm:styleLbl>
   <dgm:styleLbl name="fgAcc2">
     <dgm:fillClrLst meth="repeat">
-      <a:schemeClr val="accent1">
+      <a:schemeClr val="lt1">
         <a:alpha val="90000"/>
-        <a:tint val="40000"/>
       </a:schemeClr>
     </dgm:fillClrLst>
     <dgm:linClrLst meth="repeat">
@@ -821,9 +761,8 @@
   </dgm:styleLbl>
   <dgm:styleLbl name="fgAcc3">
     <dgm:fillClrLst meth="repeat">
-      <a:schemeClr val="accent1">
+      <a:schemeClr val="lt1">
         <a:alpha val="90000"/>
-        <a:tint val="40000"/>
       </a:schemeClr>
     </dgm:fillClrLst>
     <dgm:linClrLst meth="repeat">
@@ -838,9 +777,8 @@
   </dgm:styleLbl>
   <dgm:styleLbl name="fgAcc4">
     <dgm:fillClrLst meth="repeat">
-      <a:schemeClr val="accent1">
+      <a:schemeClr val="lt1">
         <a:alpha val="90000"/>
-        <a:tint val="40000"/>
       </a:schemeClr>
     </dgm:fillClrLst>
     <dgm:linClrLst meth="repeat">
@@ -942,243 +880,217 @@
 <file path=ppt/diagrams/data1.xml><?xml version="1.0" encoding="utf-8"?>
 <dgm:dataModel xmlns:dgm="http://schemas.openxmlformats.org/drawingml/2006/diagram" xmlns:a="http://schemas.openxmlformats.org/drawingml/2006/main">
   <dgm:ptLst>
-    <dgm:pt modelId="{44156040-AF98-4F2C-9909-9F2439F6F588}" type="doc">
-      <dgm:prSet loTypeId="urn:microsoft.com/office/officeart/2005/8/layout/chevron1" loCatId="process" qsTypeId="urn:microsoft.com/office/officeart/2005/8/quickstyle/simple1" qsCatId="simple" csTypeId="urn:microsoft.com/office/officeart/2005/8/colors/accent1_1" csCatId="accent1" phldr="1"/>
-      <dgm:spPr/>
-    </dgm:pt>
-    <dgm:pt modelId="{74020AF3-C700-4606-8917-C6A353D7963A}">
-      <dgm:prSet phldrT="[Text]"/>
+    <dgm:pt modelId="{2032C6EF-ADDB-4013-908B-3F90CAFFDB92}" type="doc">
+      <dgm:prSet loTypeId="urn:microsoft.com/office/officeart/2005/8/layout/vList2" loCatId="list" qsTypeId="urn:microsoft.com/office/officeart/2005/8/quickstyle/simple1" qsCatId="simple" csTypeId="urn:microsoft.com/office/officeart/2005/8/colors/accent1_2" csCatId="accent1"/>
       <dgm:spPr/>
       <dgm:t>
-        <a:bodyPr rtlCol="0"/>
+        <a:bodyPr/>
         <a:lstStyle/>
         <a:p>
-          <a:pPr rtl="0"/>
-          <a:r>
-            <a:rPr lang="pl-PL" noProof="0" dirty="0"/>
-            <a:t>Krok 1 — tytuł</a:t>
-          </a:r>
+          <a:endParaRPr lang="en-US"/>
         </a:p>
       </dgm:t>
-      <dgm:extLst>
-        <a:ext uri="{E40237B7-FDA0-4F09-8148-C483321AD2D9}">
-          <dgm14:cNvPr xmlns:dgm14="http://schemas.microsoft.com/office/drawing/2010/diagram" id="0" name="" title="Step 1 title"/>
-        </a:ext>
-      </dgm:extLst>
     </dgm:pt>
-    <dgm:pt modelId="{87D99D21-0B4A-4259-89FB-0E5941CB535C}" type="parTrans" cxnId="{B0E2386F-A443-4201-8130-FB9CC25AA154}">
+    <dgm:pt modelId="{958F8401-115D-4DE1-A08A-670E0DE86116}">
       <dgm:prSet/>
       <dgm:spPr/>
       <dgm:t>
-        <a:bodyPr rtlCol="0"/>
+        <a:bodyPr/>
         <a:lstStyle/>
         <a:p>
-          <a:pPr rtl="0"/>
-          <a:endParaRPr lang="pl-PL" noProof="0" dirty="0"/>
+          <a:r>
+            <a:rPr lang="pl-PL"/>
+            <a:t>Pojawienie się konkurencji ;</a:t>
+          </a:r>
+          <a:endParaRPr lang="en-US"/>
         </a:p>
       </dgm:t>
     </dgm:pt>
-    <dgm:pt modelId="{6CFF1BD9-AE1F-4488-8B72-01186EADA6FF}" type="sibTrans" cxnId="{B0E2386F-A443-4201-8130-FB9CC25AA154}">
+    <dgm:pt modelId="{1447085A-F806-4B50-9CC5-F2E3ACB0E569}" type="parTrans" cxnId="{32429A15-F89C-4F79-B47E-B714304065E9}">
       <dgm:prSet/>
       <dgm:spPr/>
       <dgm:t>
-        <a:bodyPr rtlCol="0"/>
+        <a:bodyPr/>
         <a:lstStyle/>
         <a:p>
-          <a:pPr rtl="0"/>
-          <a:endParaRPr lang="pl-PL" noProof="0" dirty="0"/>
+          <a:endParaRPr lang="en-US"/>
         </a:p>
       </dgm:t>
     </dgm:pt>
-    <dgm:pt modelId="{12E26E22-71B0-4386-A84F-ABF2FF66A99F}">
-      <dgm:prSet phldrT="[Text]"/>
-      <dgm:spPr/>
-      <dgm:t>
-        <a:bodyPr rtlCol="0"/>
-        <a:lstStyle/>
-        <a:p>
-          <a:pPr rtl="0"/>
-          <a:r>
-            <a:rPr lang="pl-PL" noProof="0" dirty="0"/>
-            <a:t>Krok 2 — tytuł</a:t>
-          </a:r>
-        </a:p>
-      </dgm:t>
-      <dgm:extLst>
-        <a:ext uri="{E40237B7-FDA0-4F09-8148-C483321AD2D9}">
-          <dgm14:cNvPr xmlns:dgm14="http://schemas.microsoft.com/office/drawing/2010/diagram" id="0" name="" title="Step 2 title"/>
-        </a:ext>
-      </dgm:extLst>
-    </dgm:pt>
-    <dgm:pt modelId="{3A6CB3CB-0F71-4CA8-93AA-0E3E3D59D313}" type="parTrans" cxnId="{937639B3-2352-48E4-A96B-F63DF2119D92}">
+    <dgm:pt modelId="{208D0666-FE8F-4967-B82C-E6271C46EA0F}" type="sibTrans" cxnId="{32429A15-F89C-4F79-B47E-B714304065E9}">
       <dgm:prSet/>
       <dgm:spPr/>
       <dgm:t>
-        <a:bodyPr rtlCol="0"/>
+        <a:bodyPr/>
         <a:lstStyle/>
         <a:p>
-          <a:pPr rtl="0"/>
-          <a:endParaRPr lang="pl-PL" noProof="0" dirty="0"/>
+          <a:endParaRPr lang="en-US"/>
         </a:p>
       </dgm:t>
     </dgm:pt>
-    <dgm:pt modelId="{E1826C46-15A2-4345-B986-53D05F21F155}" type="sibTrans" cxnId="{937639B3-2352-48E4-A96B-F63DF2119D92}">
+    <dgm:pt modelId="{8D693E22-B488-47C6-897D-5062F79AFCCB}">
       <dgm:prSet/>
       <dgm:spPr/>
       <dgm:t>
-        <a:bodyPr rtlCol="0"/>
+        <a:bodyPr/>
         <a:lstStyle/>
         <a:p>
-          <a:pPr rtl="0"/>
-          <a:endParaRPr lang="pl-PL" noProof="0" dirty="0"/>
+          <a:r>
+            <a:rPr lang="pl-PL"/>
+            <a:t>Zmiana przepisów prawnych uniemożliwiająca wprowadzenie produktu na rynek (np. odnośnie przetwarzania danych osobowych) ;</a:t>
+          </a:r>
+          <a:endParaRPr lang="en-US"/>
         </a:p>
       </dgm:t>
     </dgm:pt>
-    <dgm:pt modelId="{A8B05E70-CCF1-4080-8EEE-6873C9D4B630}">
-      <dgm:prSet phldrT="[Text]"/>
-      <dgm:spPr/>
-      <dgm:t>
-        <a:bodyPr rtlCol="0"/>
-        <a:lstStyle/>
-        <a:p>
-          <a:pPr rtl="0"/>
-          <a:r>
-            <a:rPr lang="pl-PL" noProof="0" dirty="0"/>
-            <a:t>Krok 3 — tytuł</a:t>
-          </a:r>
-        </a:p>
-      </dgm:t>
-      <dgm:extLst>
-        <a:ext uri="{E40237B7-FDA0-4F09-8148-C483321AD2D9}">
-          <dgm14:cNvPr xmlns:dgm14="http://schemas.microsoft.com/office/drawing/2010/diagram" id="0" name="" title="Step 3 title"/>
-        </a:ext>
-      </dgm:extLst>
-    </dgm:pt>
-    <dgm:pt modelId="{11D1F3D3-0002-4131-9F84-22FBF8692DA9}" type="parTrans" cxnId="{B8B909D0-D4F6-48D4-81DA-A58F34AE3646}">
+    <dgm:pt modelId="{366BB587-D87B-4E74-926A-2CF8AC870AC9}" type="parTrans" cxnId="{5BB9C88D-A9D7-42F4-9093-80FE9CD88ED8}">
       <dgm:prSet/>
       <dgm:spPr/>
       <dgm:t>
-        <a:bodyPr rtlCol="0"/>
+        <a:bodyPr/>
         <a:lstStyle/>
         <a:p>
-          <a:pPr rtl="0"/>
-          <a:endParaRPr lang="pl-PL" noProof="0" dirty="0"/>
+          <a:endParaRPr lang="en-US"/>
         </a:p>
       </dgm:t>
     </dgm:pt>
-    <dgm:pt modelId="{B6438016-7365-4FC0-A372-D90585B4B6EE}" type="sibTrans" cxnId="{B8B909D0-D4F6-48D4-81DA-A58F34AE3646}">
+    <dgm:pt modelId="{31F867BD-015C-4C67-9B13-08401063084B}" type="sibTrans" cxnId="{5BB9C88D-A9D7-42F4-9093-80FE9CD88ED8}">
       <dgm:prSet/>
       <dgm:spPr/>
       <dgm:t>
-        <a:bodyPr rtlCol="0"/>
+        <a:bodyPr/>
         <a:lstStyle/>
         <a:p>
-          <a:pPr rtl="0"/>
-          <a:endParaRPr lang="pl-PL" noProof="0" dirty="0"/>
+          <a:endParaRPr lang="en-US"/>
         </a:p>
       </dgm:t>
     </dgm:pt>
-    <dgm:pt modelId="{42147153-A6C2-4177-BA7D-2ACCC2C1B2F7}">
-      <dgm:prSet phldrT="[Text]"/>
-      <dgm:spPr/>
-      <dgm:t>
-        <a:bodyPr rtlCol="0"/>
-        <a:lstStyle/>
-        <a:p>
-          <a:pPr rtl="0"/>
-          <a:r>
-            <a:rPr lang="pl-PL" noProof="0" dirty="0"/>
-            <a:t>Krok 4 — tytuł</a:t>
-          </a:r>
-        </a:p>
-      </dgm:t>
-      <dgm:extLst>
-        <a:ext uri="{E40237B7-FDA0-4F09-8148-C483321AD2D9}">
-          <dgm14:cNvPr xmlns:dgm14="http://schemas.microsoft.com/office/drawing/2010/diagram" id="0" name="" title="Step 4 title"/>
-        </a:ext>
-      </dgm:extLst>
-    </dgm:pt>
-    <dgm:pt modelId="{C6F68745-4C20-4204-96A6-585691399C14}" type="parTrans" cxnId="{777DC3C6-D336-4C94-A624-E5582A07ECAA}">
+    <dgm:pt modelId="{5AE40EE5-5A5B-4360-89EE-4139D5A701E3}">
       <dgm:prSet/>
       <dgm:spPr/>
       <dgm:t>
-        <a:bodyPr rtlCol="0"/>
+        <a:bodyPr/>
         <a:lstStyle/>
         <a:p>
-          <a:pPr rtl="0"/>
-          <a:endParaRPr lang="pl-PL" noProof="0" dirty="0"/>
+          <a:r>
+            <a:rPr lang="pl-PL"/>
+            <a:t>Załamanie się systemu edukacji w kraju ;</a:t>
+          </a:r>
+          <a:endParaRPr lang="en-US"/>
         </a:p>
       </dgm:t>
     </dgm:pt>
-    <dgm:pt modelId="{0C6B132F-0347-46BA-86A4-3FAFB6676411}" type="sibTrans" cxnId="{777DC3C6-D336-4C94-A624-E5582A07ECAA}">
+    <dgm:pt modelId="{8E34C17A-20C8-463F-8684-B3851F72151D}" type="parTrans" cxnId="{EA88BF0D-5738-4BE0-A6D9-A6A0714D329A}">
       <dgm:prSet/>
       <dgm:spPr/>
       <dgm:t>
-        <a:bodyPr rtlCol="0"/>
+        <a:bodyPr/>
         <a:lstStyle/>
         <a:p>
-          <a:pPr rtl="0"/>
-          <a:endParaRPr lang="pl-PL" noProof="0" dirty="0"/>
+          <a:endParaRPr lang="en-US"/>
         </a:p>
       </dgm:t>
     </dgm:pt>
-    <dgm:pt modelId="{1C61A9A2-33F2-469B-8AC4-A104A5A98D78}" type="pres">
-      <dgm:prSet presAssocID="{44156040-AF98-4F2C-9909-9F2439F6F588}" presName="Name0" presStyleCnt="0">
+    <dgm:pt modelId="{E8A0BBFE-722B-4D2D-91BF-E56B9549B184}" type="sibTrans" cxnId="{EA88BF0D-5738-4BE0-A6D9-A6A0714D329A}">
+      <dgm:prSet/>
+      <dgm:spPr/>
+      <dgm:t>
+        <a:bodyPr/>
+        <a:lstStyle/>
+        <a:p>
+          <a:endParaRPr lang="en-US"/>
+        </a:p>
+      </dgm:t>
+    </dgm:pt>
+    <dgm:pt modelId="{82ED08EB-FF6C-48B1-BB72-1085F22161D4}">
+      <dgm:prSet/>
+      <dgm:spPr/>
+      <dgm:t>
+        <a:bodyPr/>
+        <a:lstStyle/>
+        <a:p>
+          <a:r>
+            <a:rPr lang="pl-PL"/>
+            <a:t>Pojawienie się globalnego kryzysu, który wstrzyma decyzje o zakupie produktu przez potencjalnych klientów ;</a:t>
+          </a:r>
+          <a:endParaRPr lang="en-US"/>
+        </a:p>
+      </dgm:t>
+    </dgm:pt>
+    <dgm:pt modelId="{DF25B450-EA45-4A46-AAE7-AC4F519104A5}" type="parTrans" cxnId="{94DC2CEA-DDBE-46B6-868B-BB31B6F1029A}">
+      <dgm:prSet/>
+      <dgm:spPr/>
+      <dgm:t>
+        <a:bodyPr/>
+        <a:lstStyle/>
+        <a:p>
+          <a:endParaRPr lang="en-US"/>
+        </a:p>
+      </dgm:t>
+    </dgm:pt>
+    <dgm:pt modelId="{1565059A-3EA6-4761-977D-B938E10CE0B1}" type="sibTrans" cxnId="{94DC2CEA-DDBE-46B6-868B-BB31B6F1029A}">
+      <dgm:prSet/>
+      <dgm:spPr/>
+      <dgm:t>
+        <a:bodyPr/>
+        <a:lstStyle/>
+        <a:p>
+          <a:endParaRPr lang="en-US"/>
+        </a:p>
+      </dgm:t>
+    </dgm:pt>
+    <dgm:pt modelId="{FB9F782E-A2EE-4CE4-BE16-5AC4D3FB13BD}" type="pres">
+      <dgm:prSet presAssocID="{2032C6EF-ADDB-4013-908B-3F90CAFFDB92}" presName="linear" presStyleCnt="0">
         <dgm:presLayoutVars>
-          <dgm:dir/>
           <dgm:animLvl val="lvl"/>
           <dgm:resizeHandles val="exact"/>
         </dgm:presLayoutVars>
       </dgm:prSet>
       <dgm:spPr/>
     </dgm:pt>
-    <dgm:pt modelId="{881B8FEC-9D20-4669-BB2E-FA9CEA0BE5A9}" type="pres">
-      <dgm:prSet presAssocID="{74020AF3-C700-4606-8917-C6A353D7963A}" presName="parTxOnly" presStyleLbl="node1" presStyleIdx="0" presStyleCnt="4">
+    <dgm:pt modelId="{4F920549-4AF7-4576-8815-F010FF59F0F6}" type="pres">
+      <dgm:prSet presAssocID="{958F8401-115D-4DE1-A08A-670E0DE86116}" presName="parentText" presStyleLbl="node1" presStyleIdx="0" presStyleCnt="4">
         <dgm:presLayoutVars>
           <dgm:chMax val="0"/>
-          <dgm:chPref val="0"/>
           <dgm:bulletEnabled val="1"/>
         </dgm:presLayoutVars>
       </dgm:prSet>
       <dgm:spPr/>
     </dgm:pt>
-    <dgm:pt modelId="{705DFC51-4C30-4A07-9F0C-6EB770961C6F}" type="pres">
-      <dgm:prSet presAssocID="{6CFF1BD9-AE1F-4488-8B72-01186EADA6FF}" presName="parTxOnlySpace" presStyleCnt="0"/>
+    <dgm:pt modelId="{1B35EB1C-0F88-4CD4-B9B3-9DE2EAB04D5A}" type="pres">
+      <dgm:prSet presAssocID="{208D0666-FE8F-4967-B82C-E6271C46EA0F}" presName="spacer" presStyleCnt="0"/>
       <dgm:spPr/>
     </dgm:pt>
-    <dgm:pt modelId="{919A589F-F74A-40C3-BE88-AB8730BCAB04}" type="pres">
-      <dgm:prSet presAssocID="{12E26E22-71B0-4386-A84F-ABF2FF66A99F}" presName="parTxOnly" presStyleLbl="node1" presStyleIdx="1" presStyleCnt="4">
+    <dgm:pt modelId="{D17B2EAA-1026-46ED-9795-928F1915252F}" type="pres">
+      <dgm:prSet presAssocID="{8D693E22-B488-47C6-897D-5062F79AFCCB}" presName="parentText" presStyleLbl="node1" presStyleIdx="1" presStyleCnt="4">
         <dgm:presLayoutVars>
           <dgm:chMax val="0"/>
-          <dgm:chPref val="0"/>
           <dgm:bulletEnabled val="1"/>
         </dgm:presLayoutVars>
       </dgm:prSet>
       <dgm:spPr/>
     </dgm:pt>
-    <dgm:pt modelId="{01C6BCDE-530E-4D03-9CF5-9AB36CDC1FE1}" type="pres">
-      <dgm:prSet presAssocID="{E1826C46-15A2-4345-B986-53D05F21F155}" presName="parTxOnlySpace" presStyleCnt="0"/>
+    <dgm:pt modelId="{564B9E79-DA54-4D2C-8142-48FFC349002F}" type="pres">
+      <dgm:prSet presAssocID="{31F867BD-015C-4C67-9B13-08401063084B}" presName="spacer" presStyleCnt="0"/>
       <dgm:spPr/>
     </dgm:pt>
-    <dgm:pt modelId="{268F2328-4548-422B-9C65-80797E16B241}" type="pres">
-      <dgm:prSet presAssocID="{A8B05E70-CCF1-4080-8EEE-6873C9D4B630}" presName="parTxOnly" presStyleLbl="node1" presStyleIdx="2" presStyleCnt="4">
+    <dgm:pt modelId="{17996BC4-5D12-417E-8391-6D959A4592E1}" type="pres">
+      <dgm:prSet presAssocID="{5AE40EE5-5A5B-4360-89EE-4139D5A701E3}" presName="parentText" presStyleLbl="node1" presStyleIdx="2" presStyleCnt="4">
         <dgm:presLayoutVars>
           <dgm:chMax val="0"/>
-          <dgm:chPref val="0"/>
           <dgm:bulletEnabled val="1"/>
         </dgm:presLayoutVars>
       </dgm:prSet>
       <dgm:spPr/>
     </dgm:pt>
-    <dgm:pt modelId="{8CB78EC1-7B74-4B6E-94C6-5F808A049A1F}" type="pres">
-      <dgm:prSet presAssocID="{B6438016-7365-4FC0-A372-D90585B4B6EE}" presName="parTxOnlySpace" presStyleCnt="0"/>
+    <dgm:pt modelId="{7A9E5F95-4C34-4C7C-8133-7ACE063C52EE}" type="pres">
+      <dgm:prSet presAssocID="{E8A0BBFE-722B-4D2D-91BF-E56B9549B184}" presName="spacer" presStyleCnt="0"/>
       <dgm:spPr/>
     </dgm:pt>
-    <dgm:pt modelId="{BDD0B0F7-A87C-4B5B-A4C3-4E4BE6EB0FE4}" type="pres">
-      <dgm:prSet presAssocID="{42147153-A6C2-4177-BA7D-2ACCC2C1B2F7}" presName="parTxOnly" presStyleLbl="node1" presStyleIdx="3" presStyleCnt="4">
+    <dgm:pt modelId="{E0789724-DD81-45C6-BBF3-B154F94632FC}" type="pres">
+      <dgm:prSet presAssocID="{82ED08EB-FF6C-48B1-BB72-1085F22161D4}" presName="parentText" presStyleLbl="node1" presStyleIdx="3" presStyleCnt="4">
         <dgm:presLayoutVars>
           <dgm:chMax val="0"/>
-          <dgm:chPref val="0"/>
           <dgm:bulletEnabled val="1"/>
         </dgm:presLayoutVars>
       </dgm:prSet>
@@ -1186,28 +1098,28 @@
     </dgm:pt>
   </dgm:ptLst>
   <dgm:cxnLst>
-    <dgm:cxn modelId="{BF4A375F-A05B-45C3-9731-23DBACB9FC02}" type="presOf" srcId="{12E26E22-71B0-4386-A84F-ABF2FF66A99F}" destId="{919A589F-F74A-40C3-BE88-AB8730BCAB04}" srcOrd="0" destOrd="0" presId="urn:microsoft.com/office/officeart/2005/8/layout/chevron1"/>
-    <dgm:cxn modelId="{B0E2386F-A443-4201-8130-FB9CC25AA154}" srcId="{44156040-AF98-4F2C-9909-9F2439F6F588}" destId="{74020AF3-C700-4606-8917-C6A353D7963A}" srcOrd="0" destOrd="0" parTransId="{87D99D21-0B4A-4259-89FB-0E5941CB535C}" sibTransId="{6CFF1BD9-AE1F-4488-8B72-01186EADA6FF}"/>
-    <dgm:cxn modelId="{BB4F9699-C9DE-46C4-A04B-CD52EF57D4C5}" type="presOf" srcId="{74020AF3-C700-4606-8917-C6A353D7963A}" destId="{881B8FEC-9D20-4669-BB2E-FA9CEA0BE5A9}" srcOrd="0" destOrd="0" presId="urn:microsoft.com/office/officeart/2005/8/layout/chevron1"/>
-    <dgm:cxn modelId="{9E75EA9C-2122-47C1-897A-5BBDE8D78AC4}" type="presOf" srcId="{A8B05E70-CCF1-4080-8EEE-6873C9D4B630}" destId="{268F2328-4548-422B-9C65-80797E16B241}" srcOrd="0" destOrd="0" presId="urn:microsoft.com/office/officeart/2005/8/layout/chevron1"/>
-    <dgm:cxn modelId="{937639B3-2352-48E4-A96B-F63DF2119D92}" srcId="{44156040-AF98-4F2C-9909-9F2439F6F588}" destId="{12E26E22-71B0-4386-A84F-ABF2FF66A99F}" srcOrd="1" destOrd="0" parTransId="{3A6CB3CB-0F71-4CA8-93AA-0E3E3D59D313}" sibTransId="{E1826C46-15A2-4345-B986-53D05F21F155}"/>
-    <dgm:cxn modelId="{37A858B6-D71C-4E86-A467-E8D17167DE19}" type="presOf" srcId="{42147153-A6C2-4177-BA7D-2ACCC2C1B2F7}" destId="{BDD0B0F7-A87C-4B5B-A4C3-4E4BE6EB0FE4}" srcOrd="0" destOrd="0" presId="urn:microsoft.com/office/officeart/2005/8/layout/chevron1"/>
-    <dgm:cxn modelId="{777DC3C6-D336-4C94-A624-E5582A07ECAA}" srcId="{44156040-AF98-4F2C-9909-9F2439F6F588}" destId="{42147153-A6C2-4177-BA7D-2ACCC2C1B2F7}" srcOrd="3" destOrd="0" parTransId="{C6F68745-4C20-4204-96A6-585691399C14}" sibTransId="{0C6B132F-0347-46BA-86A4-3FAFB6676411}"/>
-    <dgm:cxn modelId="{B8B909D0-D4F6-48D4-81DA-A58F34AE3646}" srcId="{44156040-AF98-4F2C-9909-9F2439F6F588}" destId="{A8B05E70-CCF1-4080-8EEE-6873C9D4B630}" srcOrd="2" destOrd="0" parTransId="{11D1F3D3-0002-4131-9F84-22FBF8692DA9}" sibTransId="{B6438016-7365-4FC0-A372-D90585B4B6EE}"/>
-    <dgm:cxn modelId="{383A5CFE-2D64-4002-A7C0-1E621409BFD6}" type="presOf" srcId="{44156040-AF98-4F2C-9909-9F2439F6F588}" destId="{1C61A9A2-33F2-469B-8AC4-A104A5A98D78}" srcOrd="0" destOrd="0" presId="urn:microsoft.com/office/officeart/2005/8/layout/chevron1"/>
-    <dgm:cxn modelId="{EDA037DE-3D60-46A9-9DDB-074A05981F8D}" type="presParOf" srcId="{1C61A9A2-33F2-469B-8AC4-A104A5A98D78}" destId="{881B8FEC-9D20-4669-BB2E-FA9CEA0BE5A9}" srcOrd="0" destOrd="0" presId="urn:microsoft.com/office/officeart/2005/8/layout/chevron1"/>
-    <dgm:cxn modelId="{8F2A48B2-4519-4F7D-931D-1EB2DDCF4663}" type="presParOf" srcId="{1C61A9A2-33F2-469B-8AC4-A104A5A98D78}" destId="{705DFC51-4C30-4A07-9F0C-6EB770961C6F}" srcOrd="1" destOrd="0" presId="urn:microsoft.com/office/officeart/2005/8/layout/chevron1"/>
-    <dgm:cxn modelId="{A8C49188-74D0-46A6-A671-569711775D6B}" type="presParOf" srcId="{1C61A9A2-33F2-469B-8AC4-A104A5A98D78}" destId="{919A589F-F74A-40C3-BE88-AB8730BCAB04}" srcOrd="2" destOrd="0" presId="urn:microsoft.com/office/officeart/2005/8/layout/chevron1"/>
-    <dgm:cxn modelId="{DF828B00-7F32-4A0D-9D43-9FD5AE3C854B}" type="presParOf" srcId="{1C61A9A2-33F2-469B-8AC4-A104A5A98D78}" destId="{01C6BCDE-530E-4D03-9CF5-9AB36CDC1FE1}" srcOrd="3" destOrd="0" presId="urn:microsoft.com/office/officeart/2005/8/layout/chevron1"/>
-    <dgm:cxn modelId="{2FC0E474-8734-4209-BD6D-C297DEE76CB4}" type="presParOf" srcId="{1C61A9A2-33F2-469B-8AC4-A104A5A98D78}" destId="{268F2328-4548-422B-9C65-80797E16B241}" srcOrd="4" destOrd="0" presId="urn:microsoft.com/office/officeart/2005/8/layout/chevron1"/>
-    <dgm:cxn modelId="{30A10B48-C159-4CE5-AFE2-9908BF17AD25}" type="presParOf" srcId="{1C61A9A2-33F2-469B-8AC4-A104A5A98D78}" destId="{8CB78EC1-7B74-4B6E-94C6-5F808A049A1F}" srcOrd="5" destOrd="0" presId="urn:microsoft.com/office/officeart/2005/8/layout/chevron1"/>
-    <dgm:cxn modelId="{3065F5B9-06B1-4353-A251-703F2693DE95}" type="presParOf" srcId="{1C61A9A2-33F2-469B-8AC4-A104A5A98D78}" destId="{BDD0B0F7-A87C-4B5B-A4C3-4E4BE6EB0FE4}" srcOrd="6" destOrd="0" presId="urn:microsoft.com/office/officeart/2005/8/layout/chevron1"/>
+    <dgm:cxn modelId="{EA88BF0D-5738-4BE0-A6D9-A6A0714D329A}" srcId="{2032C6EF-ADDB-4013-908B-3F90CAFFDB92}" destId="{5AE40EE5-5A5B-4360-89EE-4139D5A701E3}" srcOrd="2" destOrd="0" parTransId="{8E34C17A-20C8-463F-8684-B3851F72151D}" sibTransId="{E8A0BBFE-722B-4D2D-91BF-E56B9549B184}"/>
+    <dgm:cxn modelId="{E6692211-E2C5-4E1A-896F-84D6EAA99E19}" type="presOf" srcId="{8D693E22-B488-47C6-897D-5062F79AFCCB}" destId="{D17B2EAA-1026-46ED-9795-928F1915252F}" srcOrd="0" destOrd="0" presId="urn:microsoft.com/office/officeart/2005/8/layout/vList2"/>
+    <dgm:cxn modelId="{5FDDA911-D362-4896-A692-16C36C30C04F}" type="presOf" srcId="{5AE40EE5-5A5B-4360-89EE-4139D5A701E3}" destId="{17996BC4-5D12-417E-8391-6D959A4592E1}" srcOrd="0" destOrd="0" presId="urn:microsoft.com/office/officeart/2005/8/layout/vList2"/>
+    <dgm:cxn modelId="{32429A15-F89C-4F79-B47E-B714304065E9}" srcId="{2032C6EF-ADDB-4013-908B-3F90CAFFDB92}" destId="{958F8401-115D-4DE1-A08A-670E0DE86116}" srcOrd="0" destOrd="0" parTransId="{1447085A-F806-4B50-9CC5-F2E3ACB0E569}" sibTransId="{208D0666-FE8F-4967-B82C-E6271C46EA0F}"/>
+    <dgm:cxn modelId="{D0F30428-78B2-4C32-B7F4-154EE81D0F30}" type="presOf" srcId="{82ED08EB-FF6C-48B1-BB72-1085F22161D4}" destId="{E0789724-DD81-45C6-BBF3-B154F94632FC}" srcOrd="0" destOrd="0" presId="urn:microsoft.com/office/officeart/2005/8/layout/vList2"/>
+    <dgm:cxn modelId="{63D9297C-5753-48E1-BA0D-FDBB207DEE6E}" type="presOf" srcId="{2032C6EF-ADDB-4013-908B-3F90CAFFDB92}" destId="{FB9F782E-A2EE-4CE4-BE16-5AC4D3FB13BD}" srcOrd="0" destOrd="0" presId="urn:microsoft.com/office/officeart/2005/8/layout/vList2"/>
+    <dgm:cxn modelId="{5BB9C88D-A9D7-42F4-9093-80FE9CD88ED8}" srcId="{2032C6EF-ADDB-4013-908B-3F90CAFFDB92}" destId="{8D693E22-B488-47C6-897D-5062F79AFCCB}" srcOrd="1" destOrd="0" parTransId="{366BB587-D87B-4E74-926A-2CF8AC870AC9}" sibTransId="{31F867BD-015C-4C67-9B13-08401063084B}"/>
+    <dgm:cxn modelId="{A75EC3A4-1E9E-4DD5-B3AC-6952638FCE64}" type="presOf" srcId="{958F8401-115D-4DE1-A08A-670E0DE86116}" destId="{4F920549-4AF7-4576-8815-F010FF59F0F6}" srcOrd="0" destOrd="0" presId="urn:microsoft.com/office/officeart/2005/8/layout/vList2"/>
+    <dgm:cxn modelId="{94DC2CEA-DDBE-46B6-868B-BB31B6F1029A}" srcId="{2032C6EF-ADDB-4013-908B-3F90CAFFDB92}" destId="{82ED08EB-FF6C-48B1-BB72-1085F22161D4}" srcOrd="3" destOrd="0" parTransId="{DF25B450-EA45-4A46-AAE7-AC4F519104A5}" sibTransId="{1565059A-3EA6-4761-977D-B938E10CE0B1}"/>
+    <dgm:cxn modelId="{2A676595-5135-4BF5-B666-153ADCB36F65}" type="presParOf" srcId="{FB9F782E-A2EE-4CE4-BE16-5AC4D3FB13BD}" destId="{4F920549-4AF7-4576-8815-F010FF59F0F6}" srcOrd="0" destOrd="0" presId="urn:microsoft.com/office/officeart/2005/8/layout/vList2"/>
+    <dgm:cxn modelId="{8DDB2FEA-7A41-465E-822A-2551EB99B746}" type="presParOf" srcId="{FB9F782E-A2EE-4CE4-BE16-5AC4D3FB13BD}" destId="{1B35EB1C-0F88-4CD4-B9B3-9DE2EAB04D5A}" srcOrd="1" destOrd="0" presId="urn:microsoft.com/office/officeart/2005/8/layout/vList2"/>
+    <dgm:cxn modelId="{464700DD-69E5-4B8A-85E3-305B4079D6A3}" type="presParOf" srcId="{FB9F782E-A2EE-4CE4-BE16-5AC4D3FB13BD}" destId="{D17B2EAA-1026-46ED-9795-928F1915252F}" srcOrd="2" destOrd="0" presId="urn:microsoft.com/office/officeart/2005/8/layout/vList2"/>
+    <dgm:cxn modelId="{5356505D-2A44-481D-9FCD-6A4A6AF13955}" type="presParOf" srcId="{FB9F782E-A2EE-4CE4-BE16-5AC4D3FB13BD}" destId="{564B9E79-DA54-4D2C-8142-48FFC349002F}" srcOrd="3" destOrd="0" presId="urn:microsoft.com/office/officeart/2005/8/layout/vList2"/>
+    <dgm:cxn modelId="{66E5B965-C1D7-42F2-A05E-93E4EBB840BF}" type="presParOf" srcId="{FB9F782E-A2EE-4CE4-BE16-5AC4D3FB13BD}" destId="{17996BC4-5D12-417E-8391-6D959A4592E1}" srcOrd="4" destOrd="0" presId="urn:microsoft.com/office/officeart/2005/8/layout/vList2"/>
+    <dgm:cxn modelId="{B0492525-C8AE-43FF-870B-ED7DA7749055}" type="presParOf" srcId="{FB9F782E-A2EE-4CE4-BE16-5AC4D3FB13BD}" destId="{7A9E5F95-4C34-4C7C-8133-7ACE063C52EE}" srcOrd="5" destOrd="0" presId="urn:microsoft.com/office/officeart/2005/8/layout/vList2"/>
+    <dgm:cxn modelId="{6834E015-E2A9-4A8C-BE8B-F87E18470A02}" type="presParOf" srcId="{FB9F782E-A2EE-4CE4-BE16-5AC4D3FB13BD}" destId="{E0789724-DD81-45C6-BBF3-B154F94632FC}" srcOrd="6" destOrd="0" presId="urn:microsoft.com/office/officeart/2005/8/layout/vList2"/>
   </dgm:cxnLst>
   <dgm:bg/>
   <dgm:whole/>
   <dgm:extLst>
     <a:ext uri="http://schemas.microsoft.com/office/drawing/2008/diagram">
-      <dsp:dataModelExt xmlns:dsp="http://schemas.microsoft.com/office/drawing/2008/diagram" relId="rId7" minVer="http://schemas.openxmlformats.org/drawingml/2006/diagram"/>
+      <dsp:dataModelExt xmlns:dsp="http://schemas.microsoft.com/office/drawing/2008/diagram" relId="rId6" minVer="http://schemas.openxmlformats.org/drawingml/2006/diagram"/>
     </a:ext>
   </dgm:extLst>
 </dgm:dataModel>
@@ -1221,21 +1133,21 @@
       <dsp:cNvGrpSpPr/>
     </dsp:nvGrpSpPr>
     <dsp:grpSpPr/>
-    <dsp:sp modelId="{881B8FEC-9D20-4669-BB2E-FA9CEA0BE5A9}">
+    <dsp:sp modelId="{4F920549-4AF7-4576-8815-F010FF59F0F6}">
       <dsp:nvSpPr>
         <dsp:cNvPr id="0" name=""/>
         <dsp:cNvSpPr/>
       </dsp:nvSpPr>
       <dsp:spPr>
         <a:xfrm>
-          <a:off x="4453" y="1653197"/>
-          <a:ext cx="2592511" cy="1037004"/>
+          <a:off x="0" y="27908"/>
+          <a:ext cx="6882764" cy="1136362"/>
         </a:xfrm>
-        <a:prstGeom prst="chevron">
+        <a:prstGeom prst="roundRect">
           <a:avLst/>
         </a:prstGeom>
         <a:solidFill>
-          <a:schemeClr val="lt1">
+          <a:schemeClr val="accent1">
             <a:hueOff val="0"/>
             <a:satOff val="0"/>
             <a:lumOff val="0"/>
@@ -1244,8 +1156,7 @@
         </a:solidFill>
         <a:ln w="12700" cap="flat" cmpd="sng" algn="ctr">
           <a:solidFill>
-            <a:schemeClr val="accent1">
-              <a:shade val="80000"/>
+            <a:schemeClr val="lt1">
               <a:hueOff val="0"/>
               <a:satOff val="0"/>
               <a:lumOff val="0"/>
@@ -1272,12 +1183,12 @@
         </a:fontRef>
       </dsp:style>
       <dsp:txBody>
-        <a:bodyPr spcFirstLastPara="0" vert="horz" wrap="square" lIns="128016" tIns="42672" rIns="42672" bIns="42672" numCol="1" spcCol="1270" rtlCol="0" anchor="ctr" anchorCtr="0">
+        <a:bodyPr spcFirstLastPara="0" vert="horz" wrap="square" lIns="76200" tIns="76200" rIns="76200" bIns="76200" numCol="1" spcCol="1270" anchor="ctr" anchorCtr="0">
           <a:noAutofit/>
         </a:bodyPr>
         <a:lstStyle/>
         <a:p>
-          <a:pPr marL="0" lvl="0" indent="0" algn="ctr" defTabSz="1422400" rtl="0">
+          <a:pPr marL="0" lvl="0" indent="0" algn="l" defTabSz="889000">
             <a:lnSpc>
               <a:spcPct val="90000"/>
             </a:lnSpc>
@@ -1290,31 +1201,32 @@
             <a:buNone/>
           </a:pPr>
           <a:r>
-            <a:rPr lang="pl-PL" sz="3200" kern="1200" noProof="0" dirty="0"/>
-            <a:t>Krok 1 — tytuł</a:t>
+            <a:rPr lang="pl-PL" sz="2000" kern="1200"/>
+            <a:t>Pojawienie się konkurencji ;</a:t>
           </a:r>
+          <a:endParaRPr lang="en-US" sz="2000" kern="1200"/>
         </a:p>
       </dsp:txBody>
       <dsp:txXfrm>
-        <a:off x="522955" y="1653197"/>
-        <a:ext cx="1555507" cy="1037004"/>
+        <a:off x="55473" y="83381"/>
+        <a:ext cx="6771818" cy="1025416"/>
       </dsp:txXfrm>
     </dsp:sp>
-    <dsp:sp modelId="{919A589F-F74A-40C3-BE88-AB8730BCAB04}">
+    <dsp:sp modelId="{D17B2EAA-1026-46ED-9795-928F1915252F}">
       <dsp:nvSpPr>
         <dsp:cNvPr id="0" name=""/>
         <dsp:cNvSpPr/>
       </dsp:nvSpPr>
       <dsp:spPr>
         <a:xfrm>
-          <a:off x="2337714" y="1653197"/>
-          <a:ext cx="2592511" cy="1037004"/>
+          <a:off x="0" y="1221870"/>
+          <a:ext cx="6882764" cy="1136362"/>
         </a:xfrm>
-        <a:prstGeom prst="chevron">
+        <a:prstGeom prst="roundRect">
           <a:avLst/>
         </a:prstGeom>
         <a:solidFill>
-          <a:schemeClr val="lt1">
+          <a:schemeClr val="accent1">
             <a:hueOff val="0"/>
             <a:satOff val="0"/>
             <a:lumOff val="0"/>
@@ -1323,8 +1235,7 @@
         </a:solidFill>
         <a:ln w="12700" cap="flat" cmpd="sng" algn="ctr">
           <a:solidFill>
-            <a:schemeClr val="accent1">
-              <a:shade val="80000"/>
+            <a:schemeClr val="lt1">
               <a:hueOff val="0"/>
               <a:satOff val="0"/>
               <a:lumOff val="0"/>
@@ -1351,12 +1262,12 @@
         </a:fontRef>
       </dsp:style>
       <dsp:txBody>
-        <a:bodyPr spcFirstLastPara="0" vert="horz" wrap="square" lIns="128016" tIns="42672" rIns="42672" bIns="42672" numCol="1" spcCol="1270" rtlCol="0" anchor="ctr" anchorCtr="0">
+        <a:bodyPr spcFirstLastPara="0" vert="horz" wrap="square" lIns="76200" tIns="76200" rIns="76200" bIns="76200" numCol="1" spcCol="1270" anchor="ctr" anchorCtr="0">
           <a:noAutofit/>
         </a:bodyPr>
         <a:lstStyle/>
         <a:p>
-          <a:pPr marL="0" lvl="0" indent="0" algn="ctr" defTabSz="1422400" rtl="0">
+          <a:pPr marL="0" lvl="0" indent="0" algn="l" defTabSz="889000">
             <a:lnSpc>
               <a:spcPct val="90000"/>
             </a:lnSpc>
@@ -1369,31 +1280,32 @@
             <a:buNone/>
           </a:pPr>
           <a:r>
-            <a:rPr lang="pl-PL" sz="3200" kern="1200" noProof="0" dirty="0"/>
-            <a:t>Krok 2 — tytuł</a:t>
+            <a:rPr lang="pl-PL" sz="2000" kern="1200"/>
+            <a:t>Zmiana przepisów prawnych uniemożliwiająca wprowadzenie produktu na rynek (np. odnośnie przetwarzania danych osobowych) ;</a:t>
           </a:r>
+          <a:endParaRPr lang="en-US" sz="2000" kern="1200"/>
         </a:p>
       </dsp:txBody>
       <dsp:txXfrm>
-        <a:off x="2856216" y="1653197"/>
-        <a:ext cx="1555507" cy="1037004"/>
+        <a:off x="55473" y="1277343"/>
+        <a:ext cx="6771818" cy="1025416"/>
       </dsp:txXfrm>
     </dsp:sp>
-    <dsp:sp modelId="{268F2328-4548-422B-9C65-80797E16B241}">
+    <dsp:sp modelId="{17996BC4-5D12-417E-8391-6D959A4592E1}">
       <dsp:nvSpPr>
         <dsp:cNvPr id="0" name=""/>
         <dsp:cNvSpPr/>
       </dsp:nvSpPr>
       <dsp:spPr>
         <a:xfrm>
-          <a:off x="4670974" y="1653197"/>
-          <a:ext cx="2592511" cy="1037004"/>
+          <a:off x="0" y="2415833"/>
+          <a:ext cx="6882764" cy="1136362"/>
         </a:xfrm>
-        <a:prstGeom prst="chevron">
+        <a:prstGeom prst="roundRect">
           <a:avLst/>
         </a:prstGeom>
         <a:solidFill>
-          <a:schemeClr val="lt1">
+          <a:schemeClr val="accent1">
             <a:hueOff val="0"/>
             <a:satOff val="0"/>
             <a:lumOff val="0"/>
@@ -1402,8 +1314,7 @@
         </a:solidFill>
         <a:ln w="12700" cap="flat" cmpd="sng" algn="ctr">
           <a:solidFill>
-            <a:schemeClr val="accent1">
-              <a:shade val="80000"/>
+            <a:schemeClr val="lt1">
               <a:hueOff val="0"/>
               <a:satOff val="0"/>
               <a:lumOff val="0"/>
@@ -1430,12 +1341,12 @@
         </a:fontRef>
       </dsp:style>
       <dsp:txBody>
-        <a:bodyPr spcFirstLastPara="0" vert="horz" wrap="square" lIns="128016" tIns="42672" rIns="42672" bIns="42672" numCol="1" spcCol="1270" rtlCol="0" anchor="ctr" anchorCtr="0">
+        <a:bodyPr spcFirstLastPara="0" vert="horz" wrap="square" lIns="76200" tIns="76200" rIns="76200" bIns="76200" numCol="1" spcCol="1270" anchor="ctr" anchorCtr="0">
           <a:noAutofit/>
         </a:bodyPr>
         <a:lstStyle/>
         <a:p>
-          <a:pPr marL="0" lvl="0" indent="0" algn="ctr" defTabSz="1422400" rtl="0">
+          <a:pPr marL="0" lvl="0" indent="0" algn="l" defTabSz="889000">
             <a:lnSpc>
               <a:spcPct val="90000"/>
             </a:lnSpc>
@@ -1448,31 +1359,32 @@
             <a:buNone/>
           </a:pPr>
           <a:r>
-            <a:rPr lang="pl-PL" sz="3200" kern="1200" noProof="0" dirty="0"/>
-            <a:t>Krok 3 — tytuł</a:t>
+            <a:rPr lang="pl-PL" sz="2000" kern="1200"/>
+            <a:t>Załamanie się systemu edukacji w kraju ;</a:t>
           </a:r>
+          <a:endParaRPr lang="en-US" sz="2000" kern="1200"/>
         </a:p>
       </dsp:txBody>
       <dsp:txXfrm>
-        <a:off x="5189476" y="1653197"/>
-        <a:ext cx="1555507" cy="1037004"/>
+        <a:off x="55473" y="2471306"/>
+        <a:ext cx="6771818" cy="1025416"/>
       </dsp:txXfrm>
     </dsp:sp>
-    <dsp:sp modelId="{BDD0B0F7-A87C-4B5B-A4C3-4E4BE6EB0FE4}">
+    <dsp:sp modelId="{E0789724-DD81-45C6-BBF3-B154F94632FC}">
       <dsp:nvSpPr>
         <dsp:cNvPr id="0" name=""/>
         <dsp:cNvSpPr/>
       </dsp:nvSpPr>
       <dsp:spPr>
         <a:xfrm>
-          <a:off x="7004234" y="1653197"/>
-          <a:ext cx="2592511" cy="1037004"/>
+          <a:off x="0" y="3609795"/>
+          <a:ext cx="6882764" cy="1136362"/>
         </a:xfrm>
-        <a:prstGeom prst="chevron">
+        <a:prstGeom prst="roundRect">
           <a:avLst/>
         </a:prstGeom>
         <a:solidFill>
-          <a:schemeClr val="lt1">
+          <a:schemeClr val="accent1">
             <a:hueOff val="0"/>
             <a:satOff val="0"/>
             <a:lumOff val="0"/>
@@ -1481,8 +1393,7 @@
         </a:solidFill>
         <a:ln w="12700" cap="flat" cmpd="sng" algn="ctr">
           <a:solidFill>
-            <a:schemeClr val="accent1">
-              <a:shade val="80000"/>
+            <a:schemeClr val="lt1">
               <a:hueOff val="0"/>
               <a:satOff val="0"/>
               <a:lumOff val="0"/>
@@ -1509,12 +1420,12 @@
         </a:fontRef>
       </dsp:style>
       <dsp:txBody>
-        <a:bodyPr spcFirstLastPara="0" vert="horz" wrap="square" lIns="128016" tIns="42672" rIns="42672" bIns="42672" numCol="1" spcCol="1270" rtlCol="0" anchor="ctr" anchorCtr="0">
+        <a:bodyPr spcFirstLastPara="0" vert="horz" wrap="square" lIns="76200" tIns="76200" rIns="76200" bIns="76200" numCol="1" spcCol="1270" anchor="ctr" anchorCtr="0">
           <a:noAutofit/>
         </a:bodyPr>
         <a:lstStyle/>
         <a:p>
-          <a:pPr marL="0" lvl="0" indent="0" algn="ctr" defTabSz="1422400" rtl="0">
+          <a:pPr marL="0" lvl="0" indent="0" algn="l" defTabSz="889000">
             <a:lnSpc>
               <a:spcPct val="90000"/>
             </a:lnSpc>
@@ -1527,14 +1438,15 @@
             <a:buNone/>
           </a:pPr>
           <a:r>
-            <a:rPr lang="pl-PL" sz="3200" kern="1200" noProof="0" dirty="0"/>
-            <a:t>Krok 4 — tytuł</a:t>
+            <a:rPr lang="pl-PL" sz="2000" kern="1200"/>
+            <a:t>Pojawienie się globalnego kryzysu, który wstrzyma decyzje o zakupie produktu przez potencjalnych klientów ;</a:t>
           </a:r>
+          <a:endParaRPr lang="en-US" sz="2000" kern="1200"/>
         </a:p>
       </dsp:txBody>
       <dsp:txXfrm>
-        <a:off x="7522736" y="1653197"/>
-        <a:ext cx="1555507" cy="1037004"/>
+        <a:off x="55473" y="3665268"/>
+        <a:ext cx="6771818" cy="1025416"/>
       </dsp:txXfrm>
     </dsp:sp>
   </dsp:spTree>
@@ -1542,15 +1454,36 @@
 </file>
 
 <file path=ppt/diagrams/layout1.xml><?xml version="1.0" encoding="utf-8"?>
-<dgm:layoutDef xmlns:dgm="http://schemas.openxmlformats.org/drawingml/2006/diagram" xmlns:a="http://schemas.openxmlformats.org/drawingml/2006/main" uniqueId="urn:microsoft.com/office/officeart/2005/8/layout/chevron1">
+<dgm:layoutDef xmlns:dgm="http://schemas.openxmlformats.org/drawingml/2006/diagram" xmlns:a="http://schemas.openxmlformats.org/drawingml/2006/main" uniqueId="urn:microsoft.com/office/officeart/2005/8/layout/vList2">
   <dgm:title val=""/>
   <dgm:desc val=""/>
   <dgm:catLst>
-    <dgm:cat type="process" pri="9000"/>
+    <dgm:cat type="list" pri="3000"/>
+    <dgm:cat type="convert" pri="1000"/>
   </dgm:catLst>
-  <dgm:sampData useDef="1">
+  <dgm:sampData>
     <dgm:dataModel>
-      <dgm:ptLst/>
+      <dgm:ptLst>
+        <dgm:pt modelId="0" type="doc"/>
+        <dgm:pt modelId="1">
+          <dgm:prSet phldr="1"/>
+        </dgm:pt>
+        <dgm:pt modelId="11">
+          <dgm:prSet phldr="1"/>
+        </dgm:pt>
+        <dgm:pt modelId="2">
+          <dgm:prSet phldr="1"/>
+        </dgm:pt>
+        <dgm:pt modelId="21">
+          <dgm:prSet phldr="1"/>
+        </dgm:pt>
+      </dgm:ptLst>
+      <dgm:cxnLst>
+        <dgm:cxn modelId="4" srcId="0" destId="1" srcOrd="0" destOrd="0"/>
+        <dgm:cxn modelId="5" srcId="0" destId="2" srcOrd="1" destOrd="0"/>
+        <dgm:cxn modelId="12" srcId="1" destId="11" srcOrd="0" destOrd="0"/>
+        <dgm:cxn modelId="23" srcId="2" destId="21" srcOrd="0" destOrd="0"/>
+      </dgm:cxnLst>
       <dgm:bg/>
       <dgm:whole/>
     </dgm:dataModel>
@@ -1589,237 +1522,100 @@
       <dgm:whole/>
     </dgm:dataModel>
   </dgm:clrData>
-  <dgm:layoutNode name="Name0">
+  <dgm:layoutNode name="linear">
     <dgm:varLst>
-      <dgm:dir/>
       <dgm:animLvl val="lvl"/>
       <dgm:resizeHandles val="exact"/>
     </dgm:varLst>
-    <dgm:choose name="Name1">
-      <dgm:if name="Name2" func="var" arg="dir" op="equ" val="norm">
-        <dgm:alg type="lin"/>
-      </dgm:if>
-      <dgm:else name="Name3">
-        <dgm:alg type="lin">
-          <dgm:param type="linDir" val="fromR"/>
-        </dgm:alg>
-      </dgm:else>
-    </dgm:choose>
+    <dgm:alg type="lin">
+      <dgm:param type="linDir" val="fromT"/>
+      <dgm:param type="vertAlign" val="mid"/>
+    </dgm:alg>
     <dgm:shape xmlns:r="http://schemas.openxmlformats.org/officeDocument/2006/relationships" r:blip="">
       <dgm:adjLst/>
     </dgm:shape>
     <dgm:presOf/>
-    <dgm:choose name="Name4">
-      <dgm:if name="Name5" axis="des" func="maxDepth" op="gte" val="2">
+    <dgm:constrLst>
+      <dgm:constr type="w" for="ch" forName="parentText" refType="w"/>
+      <dgm:constr type="h" for="ch" forName="parentText" refType="primFontSz" refFor="ch" refForName="parentText" fact="0.52"/>
+      <dgm:constr type="w" for="ch" forName="childText" refType="w"/>
+      <dgm:constr type="h" for="ch" forName="childText" refType="primFontSz" refFor="ch" refForName="parentText" fact="0.46"/>
+      <dgm:constr type="h" for="ch" forName="parentText" op="equ"/>
+      <dgm:constr type="primFontSz" for="ch" forName="parentText" op="equ" val="65"/>
+      <dgm:constr type="primFontSz" for="ch" forName="childText" refType="primFontSz" refFor="ch" refForName="parentText" op="equ"/>
+      <dgm:constr type="h" for="ch" forName="spacer" refType="primFontSz" refFor="ch" refForName="parentText" fact="0.08"/>
+    </dgm:constrLst>
+    <dgm:ruleLst>
+      <dgm:rule type="primFontSz" for="ch" forName="parentText" val="5" fact="NaN" max="NaN"/>
+    </dgm:ruleLst>
+    <dgm:forEach name="Name0" axis="ch" ptType="node">
+      <dgm:layoutNode name="parentText" styleLbl="node1">
+        <dgm:varLst>
+          <dgm:chMax val="0"/>
+          <dgm:bulletEnabled val="1"/>
+        </dgm:varLst>
+        <dgm:alg type="tx">
+          <dgm:param type="parTxLTRAlign" val="l"/>
+          <dgm:param type="parTxRTLAlign" val="r"/>
+        </dgm:alg>
+        <dgm:shape xmlns:r="http://schemas.openxmlformats.org/officeDocument/2006/relationships" type="roundRect" r:blip="">
+          <dgm:adjLst/>
+        </dgm:shape>
+        <dgm:presOf axis="self"/>
         <dgm:constrLst>
-          <dgm:constr type="h" for="ch" forName="composite" refType="h"/>
-          <dgm:constr type="w" for="ch" forName="composite" refType="w"/>
-          <dgm:constr type="w" for="des" forName="parTx"/>
-          <dgm:constr type="h" for="des" forName="parTx" op="equ"/>
-          <dgm:constr type="w" for="des" forName="desTx"/>
-          <dgm:constr type="h" for="des" forName="desTx" op="equ"/>
-          <dgm:constr type="primFontSz" for="des" forName="parTx" val="65"/>
-          <dgm:constr type="secFontSz" for="des" forName="desTx" refType="primFontSz" refFor="des" refForName="parTx" op="equ"/>
-          <dgm:constr type="h" for="des" forName="parTx" refType="primFontSz" refFor="des" refForName="parTx" fact="1.5"/>
-          <dgm:constr type="h" for="des" forName="desTx" refType="primFontSz" refFor="des" refForName="parTx" fact="0.5"/>
-          <dgm:constr type="w" for="ch" forName="space" op="equ" val="-6"/>
+          <dgm:constr type="tMarg" refType="primFontSz" fact="0.3"/>
+          <dgm:constr type="bMarg" refType="primFontSz" fact="0.3"/>
+          <dgm:constr type="lMarg" refType="primFontSz" fact="0.3"/>
+          <dgm:constr type="rMarg" refType="primFontSz" fact="0.3"/>
         </dgm:constrLst>
         <dgm:ruleLst>
-          <dgm:rule type="w" for="ch" forName="composite" val="0" fact="NaN" max="NaN"/>
-          <dgm:rule type="primFontSz" for="des" forName="parTx" val="5" fact="NaN" max="NaN"/>
+          <dgm:rule type="h" val="INF" fact="NaN" max="NaN"/>
         </dgm:ruleLst>
-        <dgm:forEach name="Name6" axis="ch" ptType="node">
-          <dgm:layoutNode name="composite">
-            <dgm:alg type="composite"/>
-            <dgm:shape xmlns:r="http://schemas.openxmlformats.org/officeDocument/2006/relationships" r:blip="">
+      </dgm:layoutNode>
+      <dgm:choose name="Name1">
+        <dgm:if name="Name2" axis="ch" ptType="node" func="cnt" op="gte" val="1">
+          <dgm:layoutNode name="childText" styleLbl="revTx">
+            <dgm:varLst>
+              <dgm:bulletEnabled val="1"/>
+            </dgm:varLst>
+            <dgm:alg type="tx">
+              <dgm:param type="stBulletLvl" val="1"/>
+              <dgm:param type="lnSpAfChP" val="20"/>
+            </dgm:alg>
+            <dgm:shape xmlns:r="http://schemas.openxmlformats.org/officeDocument/2006/relationships" type="rect" r:blip="">
               <dgm:adjLst/>
             </dgm:shape>
-            <dgm:presOf/>
-            <dgm:choose name="Name7">
-              <dgm:if name="Name8" func="var" arg="dir" op="equ" val="norm">
-                <dgm:constrLst>
-                  <dgm:constr type="l" for="ch" forName="parTx"/>
-                  <dgm:constr type="w" for="ch" forName="parTx" refType="w"/>
-                  <dgm:constr type="t" for="ch" forName="parTx"/>
-                  <dgm:constr type="l" for="ch" forName="desTx"/>
-                  <dgm:constr type="w" for="ch" forName="desTx" refType="w" refFor="ch" refForName="parTx" fact="0.8"/>
-                  <dgm:constr type="t" for="ch" forName="desTx" refType="h" refFor="ch" refForName="parTx" fact="1.125"/>
-                </dgm:constrLst>
-              </dgm:if>
-              <dgm:else name="Name9">
-                <dgm:constrLst>
-                  <dgm:constr type="l" for="ch" forName="parTx"/>
-                  <dgm:constr type="w" for="ch" forName="parTx" refType="w"/>
-                  <dgm:constr type="t" for="ch" forName="parTx"/>
-                  <dgm:constr type="l" for="ch" forName="desTx" refType="w" fact="0.2"/>
-                  <dgm:constr type="w" for="ch" forName="desTx" refType="w" refFor="ch" refForName="parTx" fact="0.8"/>
-                  <dgm:constr type="t" for="ch" forName="desTx" refType="h" refFor="ch" refForName="parTx" fact="1.125"/>
-                </dgm:constrLst>
-              </dgm:else>
-            </dgm:choose>
+            <dgm:presOf axis="des" ptType="node"/>
+            <dgm:constrLst>
+              <dgm:constr type="tMarg" refType="primFontSz" fact="0.1"/>
+              <dgm:constr type="bMarg" refType="primFontSz" fact="0.1"/>
+              <dgm:constr type="lMarg" refType="w" fact="0.09"/>
+            </dgm:constrLst>
             <dgm:ruleLst>
               <dgm:rule type="h" val="INF" fact="NaN" max="NaN"/>
             </dgm:ruleLst>
-            <dgm:layoutNode name="parTx">
-              <dgm:varLst>
-                <dgm:chMax val="0"/>
-                <dgm:chPref val="0"/>
-                <dgm:bulletEnabled val="1"/>
-              </dgm:varLst>
-              <dgm:alg type="tx"/>
-              <dgm:choose name="Name10">
-                <dgm:if name="Name11" func="var" arg="dir" op="equ" val="norm">
-                  <dgm:shape xmlns:r="http://schemas.openxmlformats.org/officeDocument/2006/relationships" type="chevron" r:blip="">
+          </dgm:layoutNode>
+        </dgm:if>
+        <dgm:else name="Name3">
+          <dgm:choose name="Name4">
+            <dgm:if name="Name5" axis="par ch" ptType="doc node" func="cnt" op="gte" val="2">
+              <dgm:forEach name="Name6" axis="followSib" ptType="sibTrans" cnt="1">
+                <dgm:layoutNode name="spacer">
+                  <dgm:alg type="sp"/>
+                  <dgm:shape xmlns:r="http://schemas.openxmlformats.org/officeDocument/2006/relationships" r:blip="">
                     <dgm:adjLst/>
                   </dgm:shape>
-                </dgm:if>
-                <dgm:else name="Name12">
-                  <dgm:shape xmlns:r="http://schemas.openxmlformats.org/officeDocument/2006/relationships" rot="180" type="chevron" r:blip="">
-                    <dgm:adjLst/>
-                  </dgm:shape>
-                </dgm:else>
-              </dgm:choose>
-              <dgm:presOf axis="self" ptType="node"/>
-              <dgm:choose name="Name13">
-                <dgm:if name="Name14" func="var" arg="dir" op="equ" val="norm">
-                  <dgm:constrLst>
-                    <dgm:constr type="h" refType="w" op="lte" fact="0.4"/>
-                    <dgm:constr type="h"/>
-                    <dgm:constr type="tMarg" refType="primFontSz" fact="0.105"/>
-                    <dgm:constr type="bMarg" refType="primFontSz" fact="0.105"/>
-                    <dgm:constr type="lMarg" refType="primFontSz" fact="0.315"/>
-                    <dgm:constr type="rMarg" refType="primFontSz" fact="0.105"/>
-                  </dgm:constrLst>
-                </dgm:if>
-                <dgm:else name="Name15">
-                  <dgm:constrLst>
-                    <dgm:constr type="h" refType="w" op="lte" fact="0.4"/>
-                    <dgm:constr type="h"/>
-                    <dgm:constr type="tMarg" refType="primFontSz" fact="0.105"/>
-                    <dgm:constr type="bMarg" refType="primFontSz" fact="0.105"/>
-                    <dgm:constr type="lMarg" refType="primFontSz" fact="0.105"/>
-                    <dgm:constr type="rMarg" refType="primFontSz" fact="0.315"/>
-                  </dgm:constrLst>
-                </dgm:else>
-              </dgm:choose>
-              <dgm:ruleLst>
-                <dgm:rule type="h" val="INF" fact="NaN" max="NaN"/>
-              </dgm:ruleLst>
-            </dgm:layoutNode>
-            <dgm:layoutNode name="desTx" styleLbl="revTx">
-              <dgm:varLst>
-                <dgm:bulletEnabled val="1"/>
-              </dgm:varLst>
-              <dgm:alg type="tx">
-                <dgm:param type="stBulletLvl" val="1"/>
-              </dgm:alg>
-              <dgm:choose name="Name16">
-                <dgm:if name="Name17" axis="ch" ptType="node" func="cnt" op="gte" val="1">
-                  <dgm:shape xmlns:r="http://schemas.openxmlformats.org/officeDocument/2006/relationships" type="rect" r:blip="">
-                    <dgm:adjLst/>
-                  </dgm:shape>
-                </dgm:if>
-                <dgm:else name="Name18">
-                  <dgm:shape xmlns:r="http://schemas.openxmlformats.org/officeDocument/2006/relationships" type="rect" r:blip="" hideGeom="1">
-                    <dgm:adjLst/>
-                  </dgm:shape>
-                </dgm:else>
-              </dgm:choose>
-              <dgm:presOf axis="des" ptType="node"/>
-              <dgm:constrLst>
-                <dgm:constr type="secFontSz" val="65"/>
-                <dgm:constr type="primFontSz" refType="secFontSz"/>
-                <dgm:constr type="h"/>
-                <dgm:constr type="tMarg"/>
-                <dgm:constr type="bMarg"/>
-                <dgm:constr type="rMarg"/>
-                <dgm:constr type="lMarg"/>
-              </dgm:constrLst>
-              <dgm:ruleLst>
-                <dgm:rule type="h" val="INF" fact="NaN" max="NaN"/>
-              </dgm:ruleLst>
-            </dgm:layoutNode>
-          </dgm:layoutNode>
-          <dgm:forEach name="Name19" axis="followSib" ptType="sibTrans" cnt="1">
-            <dgm:layoutNode name="space">
-              <dgm:alg type="sp"/>
-              <dgm:shape xmlns:r="http://schemas.openxmlformats.org/officeDocument/2006/relationships" r:blip="">
-                <dgm:adjLst/>
-              </dgm:shape>
-              <dgm:presOf/>
-              <dgm:constrLst/>
-              <dgm:ruleLst/>
-            </dgm:layoutNode>
-          </dgm:forEach>
-        </dgm:forEach>
-      </dgm:if>
-      <dgm:else name="Name20">
-        <dgm:constrLst>
-          <dgm:constr type="w" for="ch" forName="parTxOnly" refType="w"/>
-          <dgm:constr type="h" for="des" forName="parTxOnly" op="equ"/>
-          <dgm:constr type="primFontSz" for="des" forName="parTxOnly" op="equ" val="65"/>
-          <dgm:constr type="w" for="ch" forName="parTxOnlySpace" refType="w" refFor="ch" refForName="parTxOnly" fact="-0.1"/>
-        </dgm:constrLst>
-        <dgm:ruleLst/>
-        <dgm:forEach name="Name21" axis="ch" ptType="node">
-          <dgm:layoutNode name="parTxOnly">
-            <dgm:varLst>
-              <dgm:chMax val="0"/>
-              <dgm:chPref val="0"/>
-              <dgm:bulletEnabled val="1"/>
-            </dgm:varLst>
-            <dgm:alg type="tx"/>
-            <dgm:choose name="Name22">
-              <dgm:if name="Name23" func="var" arg="dir" op="equ" val="norm">
-                <dgm:shape xmlns:r="http://schemas.openxmlformats.org/officeDocument/2006/relationships" type="chevron" r:blip="">
-                  <dgm:adjLst/>
-                </dgm:shape>
-              </dgm:if>
-              <dgm:else name="Name24">
-                <dgm:shape xmlns:r="http://schemas.openxmlformats.org/officeDocument/2006/relationships" rot="180" type="chevron" r:blip="">
-                  <dgm:adjLst/>
-                </dgm:shape>
-              </dgm:else>
-            </dgm:choose>
-            <dgm:presOf axis="self" ptType="node"/>
-            <dgm:choose name="Name25">
-              <dgm:if name="Name26" func="var" arg="dir" op="equ" val="norm">
-                <dgm:constrLst>
-                  <dgm:constr type="h" refType="w" op="equ" fact="0.4"/>
-                  <dgm:constr type="tMarg" refType="primFontSz" fact="0.105"/>
-                  <dgm:constr type="bMarg" refType="primFontSz" fact="0.105"/>
-                  <dgm:constr type="lMarg" refType="primFontSz" fact="0.315"/>
-                  <dgm:constr type="rMarg" refType="primFontSz" fact="0.105"/>
-                </dgm:constrLst>
-              </dgm:if>
-              <dgm:else name="Name27">
-                <dgm:constrLst>
-                  <dgm:constr type="h" refType="w" op="equ" fact="0.4"/>
-                  <dgm:constr type="tMarg" refType="primFontSz" fact="0.105"/>
-                  <dgm:constr type="bMarg" refType="primFontSz" fact="0.105"/>
-                  <dgm:constr type="lMarg" refType="primFontSz" fact="0.105"/>
-                  <dgm:constr type="rMarg" refType="primFontSz" fact="0.315"/>
-                </dgm:constrLst>
-              </dgm:else>
-            </dgm:choose>
-            <dgm:ruleLst>
-              <dgm:rule type="primFontSz" val="5" fact="NaN" max="NaN"/>
-            </dgm:ruleLst>
-          </dgm:layoutNode>
-          <dgm:forEach name="Name28" axis="followSib" ptType="sibTrans" cnt="1">
-            <dgm:layoutNode name="parTxOnlySpace">
-              <dgm:alg type="sp"/>
-              <dgm:shape xmlns:r="http://schemas.openxmlformats.org/officeDocument/2006/relationships" r:blip="">
-                <dgm:adjLst/>
-              </dgm:shape>
-              <dgm:presOf/>
-              <dgm:constrLst/>
-              <dgm:ruleLst/>
-            </dgm:layoutNode>
-          </dgm:forEach>
-        </dgm:forEach>
-      </dgm:else>
-    </dgm:choose>
+                  <dgm:presOf/>
+                  <dgm:constrLst/>
+                  <dgm:ruleLst/>
+                </dgm:layoutNode>
+              </dgm:forEach>
+            </dgm:if>
+            <dgm:else name="Name7"/>
+          </dgm:choose>
+        </dgm:else>
+      </dgm:choose>
+    </dgm:forEach>
   </dgm:layoutNode>
 </dgm:layoutDef>
 </file>
@@ -2942,7 +2738,7 @@
             <a:pPr rtl="0"/>
             <a:fld id="{57A05281-D580-4810-B8B9-EEA12FC173BA}" type="datetime1">
               <a:rPr lang="pl-PL" smtClean="0"/>
-              <a:t>06.12.2022</a:t>
+              <a:t>07.12.2022</a:t>
             </a:fld>
             <a:endParaRPr lang="pl-PL" dirty="0"/>
           </a:p>
@@ -3111,7 +2907,7 @@
             <a:fld id="{E6E2F097-D055-4919-9987-560DE14FFF53}" type="datetime1">
               <a:rPr lang="pl-PL" smtClean="0"/>
               <a:pPr/>
-              <a:t>06.12.2022</a:t>
+              <a:t>07.12.2022</a:t>
             </a:fld>
             <a:endParaRPr lang="pl-PL" dirty="0"/>
           </a:p>
@@ -3491,261 +3287,6 @@
 </p:notes>
 </file>
 
-<file path=ppt/notesSlides/notesSlide10.xml><?xml version="1.0" encoding="utf-8"?>
-<p:notes xmlns:a="http://schemas.openxmlformats.org/drawingml/2006/main" xmlns:r="http://schemas.openxmlformats.org/officeDocument/2006/relationships" xmlns:p="http://schemas.openxmlformats.org/presentationml/2006/main">
-  <p:cSld>
-    <p:spTree>
-      <p:nvGrpSpPr>
-        <p:cNvPr id="1" name=""/>
-        <p:cNvGrpSpPr/>
-        <p:nvPr/>
-      </p:nvGrpSpPr>
-      <p:grpSpPr>
-        <a:xfrm>
-          <a:off x="0" y="0"/>
-          <a:ext cx="0" cy="0"/>
-          <a:chOff x="0" y="0"/>
-          <a:chExt cx="0" cy="0"/>
-        </a:xfrm>
-      </p:grpSpPr>
-      <p:sp>
-        <p:nvSpPr>
-          <p:cNvPr id="2" name="Symbol zastępczy obrazu slajdu 1"/>
-          <p:cNvSpPr>
-            <a:spLocks noGrp="1" noRot="1" noChangeAspect="1"/>
-          </p:cNvSpPr>
-          <p:nvPr>
-            <p:ph type="sldImg"/>
-          </p:nvPr>
-        </p:nvSpPr>
-        <p:spPr/>
-      </p:sp>
-      <p:sp>
-        <p:nvSpPr>
-          <p:cNvPr id="3" name="Symbol zastępczy notatek 2"/>
-          <p:cNvSpPr>
-            <a:spLocks noGrp="1"/>
-          </p:cNvSpPr>
-          <p:nvPr>
-            <p:ph type="body" idx="1"/>
-          </p:nvPr>
-        </p:nvSpPr>
-        <p:spPr/>
-        <p:txBody>
-          <a:bodyPr/>
-          <a:lstStyle/>
-          <a:p>
-            <a:endParaRPr lang="pl-PL" dirty="0"/>
-          </a:p>
-        </p:txBody>
-      </p:sp>
-      <p:sp>
-        <p:nvSpPr>
-          <p:cNvPr id="4" name="Symbol zastępczy numeru slajdu 3"/>
-          <p:cNvSpPr>
-            <a:spLocks noGrp="1"/>
-          </p:cNvSpPr>
-          <p:nvPr>
-            <p:ph type="sldNum" sz="quarter" idx="10"/>
-          </p:nvPr>
-        </p:nvSpPr>
-        <p:spPr/>
-        <p:txBody>
-          <a:bodyPr/>
-          <a:lstStyle/>
-          <a:p>
-            <a:pPr rtl="0"/>
-            <a:fld id="{1B9A179D-2D27-49E2-B022-8EDDA2EFE682}" type="slidenum">
-              <a:rPr lang="pl-PL" smtClean="0"/>
-              <a:t>10</a:t>
-            </a:fld>
-            <a:endParaRPr lang="pl-PL" dirty="0"/>
-          </a:p>
-        </p:txBody>
-      </p:sp>
-    </p:spTree>
-    <p:extLst>
-      <p:ext uri="{BB962C8B-B14F-4D97-AF65-F5344CB8AC3E}">
-        <p14:creationId xmlns:p14="http://schemas.microsoft.com/office/powerpoint/2010/main" val="2640015802"/>
-      </p:ext>
-    </p:extLst>
-  </p:cSld>
-  <p:clrMapOvr>
-    <a:masterClrMapping/>
-  </p:clrMapOvr>
-</p:notes>
-</file>
-
-<file path=ppt/notesSlides/notesSlide11.xml><?xml version="1.0" encoding="utf-8"?>
-<p:notes xmlns:a="http://schemas.openxmlformats.org/drawingml/2006/main" xmlns:r="http://schemas.openxmlformats.org/officeDocument/2006/relationships" xmlns:p="http://schemas.openxmlformats.org/presentationml/2006/main">
-  <p:cSld>
-    <p:spTree>
-      <p:nvGrpSpPr>
-        <p:cNvPr id="1" name=""/>
-        <p:cNvGrpSpPr/>
-        <p:nvPr/>
-      </p:nvGrpSpPr>
-      <p:grpSpPr>
-        <a:xfrm>
-          <a:off x="0" y="0"/>
-          <a:ext cx="0" cy="0"/>
-          <a:chOff x="0" y="0"/>
-          <a:chExt cx="0" cy="0"/>
-        </a:xfrm>
-      </p:grpSpPr>
-      <p:sp>
-        <p:nvSpPr>
-          <p:cNvPr id="2" name="Symbol zastępczy obrazu slajdu 1"/>
-          <p:cNvSpPr>
-            <a:spLocks noGrp="1" noRot="1" noChangeAspect="1"/>
-          </p:cNvSpPr>
-          <p:nvPr>
-            <p:ph type="sldImg"/>
-          </p:nvPr>
-        </p:nvSpPr>
-        <p:spPr/>
-      </p:sp>
-      <p:sp>
-        <p:nvSpPr>
-          <p:cNvPr id="3" name="Symbol zastępczy notatek 2"/>
-          <p:cNvSpPr>
-            <a:spLocks noGrp="1"/>
-          </p:cNvSpPr>
-          <p:nvPr>
-            <p:ph type="body" idx="1"/>
-          </p:nvPr>
-        </p:nvSpPr>
-        <p:spPr/>
-        <p:txBody>
-          <a:bodyPr/>
-          <a:lstStyle/>
-          <a:p>
-            <a:endParaRPr lang="pl-PL" dirty="0"/>
-          </a:p>
-        </p:txBody>
-      </p:sp>
-      <p:sp>
-        <p:nvSpPr>
-          <p:cNvPr id="4" name="Symbol zastępczy numeru slajdu 3"/>
-          <p:cNvSpPr>
-            <a:spLocks noGrp="1"/>
-          </p:cNvSpPr>
-          <p:nvPr>
-            <p:ph type="sldNum" sz="quarter" idx="10"/>
-          </p:nvPr>
-        </p:nvSpPr>
-        <p:spPr/>
-        <p:txBody>
-          <a:bodyPr/>
-          <a:lstStyle/>
-          <a:p>
-            <a:pPr rtl="0"/>
-            <a:fld id="{1B9A179D-2D27-49E2-B022-8EDDA2EFE682}" type="slidenum">
-              <a:rPr lang="pl-PL" smtClean="0"/>
-              <a:t>11</a:t>
-            </a:fld>
-            <a:endParaRPr lang="pl-PL" dirty="0"/>
-          </a:p>
-        </p:txBody>
-      </p:sp>
-    </p:spTree>
-    <p:extLst>
-      <p:ext uri="{BB962C8B-B14F-4D97-AF65-F5344CB8AC3E}">
-        <p14:creationId xmlns:p14="http://schemas.microsoft.com/office/powerpoint/2010/main" val="1369970100"/>
-      </p:ext>
-    </p:extLst>
-  </p:cSld>
-  <p:clrMapOvr>
-    <a:masterClrMapping/>
-  </p:clrMapOvr>
-</p:notes>
-</file>
-
-<file path=ppt/notesSlides/notesSlide12.xml><?xml version="1.0" encoding="utf-8"?>
-<p:notes xmlns:a="http://schemas.openxmlformats.org/drawingml/2006/main" xmlns:r="http://schemas.openxmlformats.org/officeDocument/2006/relationships" xmlns:p="http://schemas.openxmlformats.org/presentationml/2006/main">
-  <p:cSld>
-    <p:spTree>
-      <p:nvGrpSpPr>
-        <p:cNvPr id="1" name=""/>
-        <p:cNvGrpSpPr/>
-        <p:nvPr/>
-      </p:nvGrpSpPr>
-      <p:grpSpPr>
-        <a:xfrm>
-          <a:off x="0" y="0"/>
-          <a:ext cx="0" cy="0"/>
-          <a:chOff x="0" y="0"/>
-          <a:chExt cx="0" cy="0"/>
-        </a:xfrm>
-      </p:grpSpPr>
-      <p:sp>
-        <p:nvSpPr>
-          <p:cNvPr id="2" name="Symbol zastępczy obrazu slajdu 1"/>
-          <p:cNvSpPr>
-            <a:spLocks noGrp="1" noRot="1" noChangeAspect="1"/>
-          </p:cNvSpPr>
-          <p:nvPr>
-            <p:ph type="sldImg"/>
-          </p:nvPr>
-        </p:nvSpPr>
-        <p:spPr/>
-      </p:sp>
-      <p:sp>
-        <p:nvSpPr>
-          <p:cNvPr id="3" name="Symbol zastępczy notatek 2"/>
-          <p:cNvSpPr>
-            <a:spLocks noGrp="1"/>
-          </p:cNvSpPr>
-          <p:nvPr>
-            <p:ph type="body" idx="1"/>
-          </p:nvPr>
-        </p:nvSpPr>
-        <p:spPr/>
-        <p:txBody>
-          <a:bodyPr/>
-          <a:lstStyle/>
-          <a:p>
-            <a:endParaRPr lang="pl-PL" dirty="0"/>
-          </a:p>
-        </p:txBody>
-      </p:sp>
-      <p:sp>
-        <p:nvSpPr>
-          <p:cNvPr id="4" name="Symbol zastępczy numeru slajdu 3"/>
-          <p:cNvSpPr>
-            <a:spLocks noGrp="1"/>
-          </p:cNvSpPr>
-          <p:nvPr>
-            <p:ph type="sldNum" sz="quarter" idx="10"/>
-          </p:nvPr>
-        </p:nvSpPr>
-        <p:spPr/>
-        <p:txBody>
-          <a:bodyPr/>
-          <a:lstStyle/>
-          <a:p>
-            <a:pPr rtl="0"/>
-            <a:fld id="{1B9A179D-2D27-49E2-B022-8EDDA2EFE682}" type="slidenum">
-              <a:rPr lang="pl-PL" smtClean="0"/>
-              <a:t>12</a:t>
-            </a:fld>
-            <a:endParaRPr lang="pl-PL" dirty="0"/>
-          </a:p>
-        </p:txBody>
-      </p:sp>
-    </p:spTree>
-    <p:extLst>
-      <p:ext uri="{BB962C8B-B14F-4D97-AF65-F5344CB8AC3E}">
-        <p14:creationId xmlns:p14="http://schemas.microsoft.com/office/powerpoint/2010/main" val="4047476361"/>
-      </p:ext>
-    </p:extLst>
-  </p:cSld>
-  <p:clrMapOvr>
-    <a:masterClrMapping/>
-  </p:clrMapOvr>
-</p:notes>
-</file>
-
 <file path=ppt/notesSlides/notesSlide2.xml><?xml version="1.0" encoding="utf-8"?>
 <p:notes xmlns:a="http://schemas.openxmlformats.org/drawingml/2006/main" xmlns:r="http://schemas.openxmlformats.org/officeDocument/2006/relationships" xmlns:p="http://schemas.openxmlformats.org/presentationml/2006/main">
   <p:cSld>
@@ -3906,7 +3447,7 @@
     </p:spTree>
     <p:extLst>
       <p:ext uri="{BB962C8B-B14F-4D97-AF65-F5344CB8AC3E}">
-        <p14:creationId xmlns:p14="http://schemas.microsoft.com/office/powerpoint/2010/main" val="1237136731"/>
+        <p14:creationId xmlns:p14="http://schemas.microsoft.com/office/powerpoint/2010/main" val="853395554"/>
       </p:ext>
     </p:extLst>
   </p:cSld>
@@ -3991,7 +3532,7 @@
     </p:spTree>
     <p:extLst>
       <p:ext uri="{BB962C8B-B14F-4D97-AF65-F5344CB8AC3E}">
-        <p14:creationId xmlns:p14="http://schemas.microsoft.com/office/powerpoint/2010/main" val="774130033"/>
+        <p14:creationId xmlns:p14="http://schemas.microsoft.com/office/powerpoint/2010/main" val="2009780555"/>
       </p:ext>
     </p:extLst>
   </p:cSld>
@@ -4076,7 +3617,7 @@
     </p:spTree>
     <p:extLst>
       <p:ext uri="{BB962C8B-B14F-4D97-AF65-F5344CB8AC3E}">
-        <p14:creationId xmlns:p14="http://schemas.microsoft.com/office/powerpoint/2010/main" val="853395554"/>
+        <p14:creationId xmlns:p14="http://schemas.microsoft.com/office/powerpoint/2010/main" val="2840067105"/>
       </p:ext>
     </p:extLst>
   </p:cSld>
@@ -4161,7 +3702,7 @@
     </p:spTree>
     <p:extLst>
       <p:ext uri="{BB962C8B-B14F-4D97-AF65-F5344CB8AC3E}">
-        <p14:creationId xmlns:p14="http://schemas.microsoft.com/office/powerpoint/2010/main" val="493320029"/>
+        <p14:creationId xmlns:p14="http://schemas.microsoft.com/office/powerpoint/2010/main" val="2640015802"/>
       </p:ext>
     </p:extLst>
   </p:cSld>
@@ -4246,7 +3787,7 @@
     </p:spTree>
     <p:extLst>
       <p:ext uri="{BB962C8B-B14F-4D97-AF65-F5344CB8AC3E}">
-        <p14:creationId xmlns:p14="http://schemas.microsoft.com/office/powerpoint/2010/main" val="2009780555"/>
+        <p14:creationId xmlns:p14="http://schemas.microsoft.com/office/powerpoint/2010/main" val="1369970100"/>
       </p:ext>
     </p:extLst>
   </p:cSld>
@@ -4331,7 +3872,7 @@
     </p:spTree>
     <p:extLst>
       <p:ext uri="{BB962C8B-B14F-4D97-AF65-F5344CB8AC3E}">
-        <p14:creationId xmlns:p14="http://schemas.microsoft.com/office/powerpoint/2010/main" val="2840067105"/>
+        <p14:creationId xmlns:p14="http://schemas.microsoft.com/office/powerpoint/2010/main" val="4047476361"/>
       </p:ext>
     </p:extLst>
   </p:cSld>
@@ -4416,7 +3957,7 @@
     </p:spTree>
     <p:extLst>
       <p:ext uri="{BB962C8B-B14F-4D97-AF65-F5344CB8AC3E}">
-        <p14:creationId xmlns:p14="http://schemas.microsoft.com/office/powerpoint/2010/main" val="1897757234"/>
+        <p14:creationId xmlns:p14="http://schemas.microsoft.com/office/powerpoint/2010/main" val="681331389"/>
       </p:ext>
     </p:extLst>
   </p:cSld>
@@ -5031,7 +4572,7 @@
             <a:fld id="{A4E76AF1-4389-4119-8151-8E992C940520}" type="datetime1">
               <a:rPr lang="pl-PL" smtClean="0"/>
               <a:pPr/>
-              <a:t>06.12.2022</a:t>
+              <a:t>07.12.2022</a:t>
             </a:fld>
             <a:endParaRPr lang="pl-PL" dirty="0"/>
           </a:p>
@@ -5649,7 +5190,7 @@
             <a:fld id="{BB7B8A9D-4C90-4946-9EAB-BC8EB672FEE5}" type="datetime1">
               <a:rPr lang="pl-PL" smtClean="0"/>
               <a:pPr/>
-              <a:t>06.12.2022</a:t>
+              <a:t>07.12.2022</a:t>
             </a:fld>
             <a:endParaRPr lang="pl-PL" dirty="0"/>
           </a:p>
@@ -5842,7 +5383,7 @@
             <a:fld id="{11BB9D6C-C144-4F75-9A53-982208720C55}" type="datetime1">
               <a:rPr lang="pl-PL" smtClean="0"/>
               <a:pPr/>
-              <a:t>06.12.2022</a:t>
+              <a:t>07.12.2022</a:t>
             </a:fld>
             <a:endParaRPr lang="pl-PL" dirty="0"/>
           </a:p>
@@ -6185,7 +5726,7 @@
             <a:fld id="{D4C86CCD-1F69-4877-BD88-8D17F4461CE1}" type="datetime1">
               <a:rPr lang="pl-PL" smtClean="0"/>
               <a:pPr/>
-              <a:t>06.12.2022</a:t>
+              <a:t>07.12.2022</a:t>
             </a:fld>
             <a:endParaRPr lang="pl-PL" dirty="0"/>
           </a:p>
@@ -6387,7 +5928,7 @@
             <a:fld id="{7442CF46-E3B7-4F3A-BF6D-3D24D2F7AE2C}" type="datetime1">
               <a:rPr lang="pl-PL" smtClean="0"/>
               <a:pPr/>
-              <a:t>06.12.2022</a:t>
+              <a:t>07.12.2022</a:t>
             </a:fld>
             <a:endParaRPr lang="pl-PL" dirty="0"/>
           </a:p>
@@ -7570,7 +7111,7 @@
             <a:fld id="{E0D23B53-E198-4E6C-BE6A-EB2462D2B5A3}" type="datetime1">
               <a:rPr lang="pl-PL" smtClean="0"/>
               <a:pPr/>
-              <a:t>06.12.2022</a:t>
+              <a:t>07.12.2022</a:t>
             </a:fld>
             <a:endParaRPr lang="pl-PL" dirty="0"/>
           </a:p>
@@ -7964,7 +7505,7 @@
             <a:fld id="{BC5111B2-1E29-4215-B87F-CDDA0ADDCF32}" type="datetime1">
               <a:rPr lang="pl-PL" smtClean="0"/>
               <a:pPr/>
-              <a:t>06.12.2022</a:t>
+              <a:t>07.12.2022</a:t>
             </a:fld>
             <a:endParaRPr lang="pl-PL" dirty="0"/>
           </a:p>
@@ -8105,7 +7646,7 @@
             <a:fld id="{39405AB1-0C56-4CDB-8E3E-6E3283695A98}" type="datetime1">
               <a:rPr lang="pl-PL" smtClean="0"/>
               <a:pPr/>
-              <a:t>06.12.2022</a:t>
+              <a:t>07.12.2022</a:t>
             </a:fld>
             <a:endParaRPr lang="pl-PL" dirty="0"/>
           </a:p>
@@ -8222,7 +7763,7 @@
             <a:fld id="{1BC0969F-AB50-453F-BB97-91F1E1D91D02}" type="datetime1">
               <a:rPr lang="pl-PL" smtClean="0"/>
               <a:pPr/>
-              <a:t>06.12.2022</a:t>
+              <a:t>07.12.2022</a:t>
             </a:fld>
             <a:endParaRPr lang="pl-PL" dirty="0"/>
           </a:p>
@@ -8524,7 +8065,7 @@
             <a:fld id="{46BCA00C-ABF0-4AE3-8CCD-DDCCDB96FDA7}" type="datetime1">
               <a:rPr lang="pl-PL" smtClean="0"/>
               <a:pPr/>
-              <a:t>06.12.2022</a:t>
+              <a:t>07.12.2022</a:t>
             </a:fld>
             <a:endParaRPr lang="pl-PL" dirty="0"/>
           </a:p>
@@ -8908,7 +8449,7 @@
             <a:fld id="{95C8D36F-D05F-411F-A3BD-317FB84B7909}" type="datetime1">
               <a:rPr lang="pl-PL" smtClean="0"/>
               <a:pPr/>
-              <a:t>06.12.2022</a:t>
+              <a:t>07.12.2022</a:t>
             </a:fld>
             <a:endParaRPr lang="pl-PL" dirty="0"/>
           </a:p>
@@ -9316,9 +8857,16 @@
             <p:ph type="ctrTitle"/>
           </p:nvPr>
         </p:nvSpPr>
-        <p:spPr/>
-        <p:txBody>
-          <a:bodyPr rtlCol="0"/>
+        <p:spPr>
+          <a:xfrm>
+            <a:off x="1295401" y="1873584"/>
+            <a:ext cx="5120640" cy="2560320"/>
+          </a:xfrm>
+        </p:spPr>
+        <p:txBody>
+          <a:bodyPr rtlCol="0" anchor="b">
+            <a:normAutofit/>
+          </a:bodyPr>
           <a:lstStyle/>
           <a:p>
             <a:pPr rtl="0"/>
@@ -9339,7 +8887,7 @@
             <p:ph type="pic" sz="quarter" idx="10"/>
           </p:nvPr>
         </p:nvPicPr>
-        <p:blipFill>
+        <p:blipFill rotWithShape="1">
           <a:blip r:embed="rId3" cstate="print">
             <a:extLst>
               <a:ext uri="{28A0092B-C50C-407E-A947-70E740481C1C}">
@@ -9347,12 +8895,16 @@
               </a:ext>
             </a:extLst>
           </a:blip>
-          <a:srcRect t="14" b="14"/>
-          <a:stretch>
-            <a:fillRect/>
-          </a:stretch>
+          <a:srcRect r="70"/>
+          <a:stretch/>
         </p:blipFill>
-        <p:spPr/>
+        <p:spPr>
+          <a:xfrm>
+            <a:off x="6743703" y="10"/>
+            <a:ext cx="5448297" cy="6857990"/>
+          </a:xfrm>
+          <a:noFill/>
+        </p:spPr>
       </p:pic>
       <p:sp>
         <p:nvSpPr>
@@ -9364,9 +8916,16 @@
             <p:ph type="subTitle" idx="1"/>
           </p:nvPr>
         </p:nvSpPr>
-        <p:spPr/>
-        <p:txBody>
-          <a:bodyPr rtlCol="0"/>
+        <p:spPr>
+          <a:xfrm>
+            <a:off x="1295401" y="4572000"/>
+            <a:ext cx="5120640" cy="1600200"/>
+          </a:xfrm>
+        </p:spPr>
+        <p:txBody>
+          <a:bodyPr rtlCol="0">
+            <a:normAutofit/>
+          </a:bodyPr>
           <a:lstStyle/>
           <a:p>
             <a:pPr rtl="0"/>
@@ -9387,14 +8946,14 @@
   <p:clrMapOvr>
     <a:masterClrMapping/>
   </p:clrMapOvr>
-  <mc:AlternateContent xmlns:mc="http://schemas.openxmlformats.org/markup-compatibility/2006" xmlns:p14="http://schemas.microsoft.com/office/powerpoint/2010/main">
-    <mc:Choice Requires="p14">
-      <p:transition spd="med" p14:dur="700">
-        <p:fade/>
+  <mc:AlternateContent xmlns:mc="http://schemas.openxmlformats.org/markup-compatibility/2006">
+    <mc:Choice xmlns:p159="http://schemas.microsoft.com/office/powerpoint/2015/09/main" Requires="p159">
+      <p:transition xmlns:p14="http://schemas.microsoft.com/office/powerpoint/2010/main" spd="slow" p14:dur="2000">
+        <p159:morph option="byObject"/>
       </p:transition>
     </mc:Choice>
-    <mc:Fallback xmlns="">
-      <p:transition spd="med">
+    <mc:Fallback>
+      <p:transition spd="slow">
         <p:fade/>
       </p:transition>
     </mc:Fallback>
@@ -9421,7 +8980,13 @@
       </p:grpSpPr>
       <p:sp>
         <p:nvSpPr>
-          <p:cNvPr id="2" name="Tytuł 1"/>
+          <p:cNvPr id="2" name="Tytuł 1">
+            <a:extLst>
+              <a:ext uri="{FF2B5EF4-FFF2-40B4-BE49-F238E27FC236}">
+                <a16:creationId xmlns:a16="http://schemas.microsoft.com/office/drawing/2014/main" id="{A563F422-C4C8-BF02-DA9B-BEF0EEAE8EA5}"/>
+              </a:ext>
+            </a:extLst>
+          </p:cNvPr>
           <p:cNvSpPr>
             <a:spLocks noGrp="1"/>
           </p:cNvSpPr>
@@ -9429,307 +8994,99 @@
             <p:ph type="title"/>
           </p:nvPr>
         </p:nvSpPr>
-        <p:spPr/>
-        <p:txBody>
-          <a:bodyPr rtlCol="0"/>
+        <p:spPr>
+          <a:xfrm>
+            <a:off x="1295400" y="255134"/>
+            <a:ext cx="9601200" cy="821191"/>
+          </a:xfrm>
+        </p:spPr>
+        <p:txBody>
+          <a:bodyPr anchor="b">
+            <a:normAutofit/>
+          </a:bodyPr>
           <a:lstStyle/>
           <a:p>
-            <a:pPr rtl="0"/>
             <a:r>
               <a:rPr lang="pl-PL" dirty="0"/>
-              <a:t>Dodaj tytuł slajdu — 5</a:t>
-            </a:r>
-          </a:p>
-        </p:txBody>
-      </p:sp>
-      <p:sp>
-        <p:nvSpPr>
-          <p:cNvPr id="5" name="Zawartość — symbol zastępczy 4"/>
-          <p:cNvSpPr>
-            <a:spLocks noGrp="1"/>
-          </p:cNvSpPr>
+              <a:t>Główne ryzyka</a:t>
+            </a:r>
+          </a:p>
+        </p:txBody>
+      </p:sp>
+      <p:graphicFrame>
+        <p:nvGraphicFramePr>
+          <p:cNvPr id="22" name="Content Placeholder 2">
+            <a:extLst>
+              <a:ext uri="{FF2B5EF4-FFF2-40B4-BE49-F238E27FC236}">
+                <a16:creationId xmlns:a16="http://schemas.microsoft.com/office/drawing/2014/main" id="{BF0B3BB9-A401-8506-A1DB-75970A8475DC}"/>
+              </a:ext>
+            </a:extLst>
+          </p:cNvPr>
+          <p:cNvGraphicFramePr>
+            <a:graphicFrameLocks noGrp="1"/>
+          </p:cNvGraphicFramePr>
           <p:nvPr>
             <p:ph idx="1"/>
-          </p:nvPr>
-        </p:nvSpPr>
-        <p:spPr/>
-        <p:txBody>
-          <a:bodyPr rtlCol="0"/>
-          <a:lstStyle/>
-          <a:p>
-            <a:pPr rtl="0"/>
-            <a:endParaRPr lang="pl-PL" dirty="0"/>
-          </a:p>
-        </p:txBody>
-      </p:sp>
-      <p:sp>
-        <p:nvSpPr>
-          <p:cNvPr id="6" name="Tekst — symbol zastępczy 5"/>
-          <p:cNvSpPr>
-            <a:spLocks noGrp="1"/>
-          </p:cNvSpPr>
-          <p:nvPr>
-            <p:ph type="body" sz="half" idx="2"/>
-          </p:nvPr>
-        </p:nvSpPr>
-        <p:spPr/>
-        <p:txBody>
-          <a:bodyPr rtlCol="0"/>
-          <a:lstStyle/>
-          <a:p>
-            <a:pPr rtl="0"/>
-            <a:endParaRPr lang="pl-PL" dirty="0"/>
-          </a:p>
-        </p:txBody>
-      </p:sp>
+            <p:extLst>
+              <p:ext uri="{D42A27DB-BD31-4B8C-83A1-F6EECF244321}">
+                <p14:modId xmlns:p14="http://schemas.microsoft.com/office/powerpoint/2010/main" val="177705436"/>
+              </p:ext>
+            </p:extLst>
+          </p:nvPr>
+        </p:nvGraphicFramePr>
+        <p:xfrm>
+          <a:off x="676275" y="1828800"/>
+          <a:ext cx="6882764" cy="4774066"/>
+        </p:xfrm>
+        <a:graphic>
+          <a:graphicData uri="http://schemas.openxmlformats.org/drawingml/2006/diagram">
+            <dgm:relIds xmlns:dgm="http://schemas.openxmlformats.org/drawingml/2006/diagram" xmlns:r="http://schemas.openxmlformats.org/officeDocument/2006/relationships" r:dm="rId2" r:lo="rId3" r:qs="rId4" r:cs="rId5"/>
+          </a:graphicData>
+        </a:graphic>
+      </p:graphicFrame>
+      <p:pic>
+        <p:nvPicPr>
+          <p:cNvPr id="10" name="Obraz 9">
+            <a:extLst>
+              <a:ext uri="{FF2B5EF4-FFF2-40B4-BE49-F238E27FC236}">
+                <a16:creationId xmlns:a16="http://schemas.microsoft.com/office/drawing/2014/main" id="{EEFC1FE6-11C9-9C1C-2356-98A4E31717B0}"/>
+              </a:ext>
+            </a:extLst>
+          </p:cNvPr>
+          <p:cNvPicPr>
+            <a:picLocks noChangeAspect="1"/>
+          </p:cNvPicPr>
+          <p:nvPr/>
+        </p:nvPicPr>
+        <p:blipFill>
+          <a:blip r:embed="rId7"/>
+          <a:stretch>
+            <a:fillRect/>
+          </a:stretch>
+        </p:blipFill>
+        <p:spPr>
+          <a:xfrm>
+            <a:off x="9290606" y="2428875"/>
+            <a:ext cx="2117298" cy="3570171"/>
+          </a:xfrm>
+          <a:prstGeom prst="rect">
+            <a:avLst/>
+          </a:prstGeom>
+        </p:spPr>
+      </p:pic>
     </p:spTree>
     <p:extLst>
       <p:ext uri="{BB962C8B-B14F-4D97-AF65-F5344CB8AC3E}">
-        <p14:creationId xmlns:p14="http://schemas.microsoft.com/office/powerpoint/2010/main" val="332843759"/>
+        <p14:creationId xmlns:p14="http://schemas.microsoft.com/office/powerpoint/2010/main" val="920239087"/>
       </p:ext>
     </p:extLst>
   </p:cSld>
   <p:clrMapOvr>
     <a:masterClrMapping/>
   </p:clrMapOvr>
-  <mc:AlternateContent xmlns:mc="http://schemas.openxmlformats.org/markup-compatibility/2006" xmlns:p14="http://schemas.microsoft.com/office/powerpoint/2010/main">
-    <mc:Choice Requires="p14">
-      <p:transition spd="med" p14:dur="700">
-        <p:fade/>
-      </p:transition>
-    </mc:Choice>
-    <mc:Fallback xmlns="">
-      <p:transition spd="med">
-        <p:fade/>
-      </p:transition>
-    </mc:Fallback>
-  </mc:AlternateContent>
-</p:sld>
-</file>
-
-<file path=ppt/slides/slide11.xml><?xml version="1.0" encoding="utf-8"?>
-<p:sld xmlns:a="http://schemas.openxmlformats.org/drawingml/2006/main" xmlns:r="http://schemas.openxmlformats.org/officeDocument/2006/relationships" xmlns:p="http://schemas.openxmlformats.org/presentationml/2006/main">
-  <p:cSld>
-    <p:spTree>
-      <p:nvGrpSpPr>
-        <p:cNvPr id="1" name=""/>
-        <p:cNvGrpSpPr/>
-        <p:nvPr/>
-      </p:nvGrpSpPr>
-      <p:grpSpPr>
-        <a:xfrm>
-          <a:off x="0" y="0"/>
-          <a:ext cx="0" cy="0"/>
-          <a:chOff x="0" y="0"/>
-          <a:chExt cx="0" cy="0"/>
-        </a:xfrm>
-      </p:grpSpPr>
-      <p:sp>
-        <p:nvSpPr>
-          <p:cNvPr id="2" name="Tytuł 1"/>
-          <p:cNvSpPr>
-            <a:spLocks noGrp="1"/>
-          </p:cNvSpPr>
-          <p:nvPr>
-            <p:ph type="title"/>
-          </p:nvPr>
-        </p:nvSpPr>
-        <p:spPr/>
-        <p:txBody>
-          <a:bodyPr rtlCol="0"/>
-          <a:lstStyle/>
-          <a:p>
-            <a:pPr rtl="0"/>
-            <a:r>
-              <a:rPr lang="pl-PL" dirty="0"/>
-              <a:t>Dodaj tytuł slajdu — 6</a:t>
-            </a:r>
-          </a:p>
-        </p:txBody>
-      </p:sp>
-      <p:sp>
-        <p:nvSpPr>
-          <p:cNvPr id="5" name="Obraz — symbol zastępczy 4" descr="Pusty symbol zastępczy pozwalający dodać obraz. Kliknij symbol zastępczy i wybierz obraz, który chcesz dodać"/>
-          <p:cNvSpPr>
-            <a:spLocks noGrp="1"/>
-          </p:cNvSpPr>
-          <p:nvPr>
-            <p:ph type="pic" idx="1"/>
-          </p:nvPr>
-        </p:nvSpPr>
-        <p:spPr/>
-      </p:sp>
-      <p:sp>
-        <p:nvSpPr>
-          <p:cNvPr id="6" name="Tekst — symbol zastępczy 5"/>
-          <p:cNvSpPr>
-            <a:spLocks noGrp="1"/>
-          </p:cNvSpPr>
-          <p:nvPr>
-            <p:ph type="body" sz="half" idx="2"/>
-          </p:nvPr>
-        </p:nvSpPr>
-        <p:spPr/>
-        <p:txBody>
-          <a:bodyPr rtlCol="0"/>
-          <a:lstStyle/>
-          <a:p>
-            <a:pPr rtl="0"/>
-            <a:endParaRPr lang="pl-PL" dirty="0"/>
-          </a:p>
-        </p:txBody>
-      </p:sp>
-    </p:spTree>
-    <p:extLst>
-      <p:ext uri="{BB962C8B-B14F-4D97-AF65-F5344CB8AC3E}">
-        <p14:creationId xmlns:p14="http://schemas.microsoft.com/office/powerpoint/2010/main" val="4129926194"/>
-      </p:ext>
-    </p:extLst>
-  </p:cSld>
-  <p:clrMapOvr>
-    <a:masterClrMapping/>
-  </p:clrMapOvr>
-  <mc:AlternateContent xmlns:mc="http://schemas.openxmlformats.org/markup-compatibility/2006" xmlns:p14="http://schemas.microsoft.com/office/powerpoint/2010/main">
-    <mc:Choice Requires="p14">
-      <p:transition spd="med" p14:dur="700">
-        <p:fade/>
-      </p:transition>
-    </mc:Choice>
-    <mc:Fallback xmlns="">
-      <p:transition spd="med">
-        <p:fade/>
-      </p:transition>
-    </mc:Fallback>
-  </mc:AlternateContent>
-</p:sld>
-</file>
-
-<file path=ppt/slides/slide12.xml><?xml version="1.0" encoding="utf-8"?>
-<p:sld xmlns:a="http://schemas.openxmlformats.org/drawingml/2006/main" xmlns:r="http://schemas.openxmlformats.org/officeDocument/2006/relationships" xmlns:p="http://schemas.openxmlformats.org/presentationml/2006/main">
-  <p:cSld>
-    <p:spTree>
-      <p:nvGrpSpPr>
-        <p:cNvPr id="1" name=""/>
-        <p:cNvGrpSpPr/>
-        <p:nvPr/>
-      </p:nvGrpSpPr>
-      <p:grpSpPr>
-        <a:xfrm>
-          <a:off x="0" y="0"/>
-          <a:ext cx="0" cy="0"/>
-          <a:chOff x="0" y="0"/>
-          <a:chExt cx="0" cy="0"/>
-        </a:xfrm>
-      </p:grpSpPr>
-      <p:sp>
-        <p:nvSpPr>
-          <p:cNvPr id="2" name="Tytuł 1"/>
-          <p:cNvSpPr>
-            <a:spLocks noGrp="1"/>
-          </p:cNvSpPr>
-          <p:nvPr>
-            <p:ph type="title"/>
-          </p:nvPr>
-        </p:nvSpPr>
-        <p:spPr/>
-        <p:txBody>
-          <a:bodyPr rtlCol="0"/>
-          <a:lstStyle/>
-          <a:p>
-            <a:pPr rtl="0"/>
-            <a:r>
-              <a:rPr lang="pl-PL" dirty="0"/>
-              <a:t>Dodaj tytuł slajdu — 7</a:t>
-            </a:r>
-          </a:p>
-        </p:txBody>
-      </p:sp>
-      <p:sp>
-        <p:nvSpPr>
-          <p:cNvPr id="4" name="Obraz — symbol zastępczy 3"/>
-          <p:cNvSpPr>
-            <a:spLocks noGrp="1"/>
-          </p:cNvSpPr>
-          <p:nvPr>
-            <p:ph type="pic" idx="1"/>
-          </p:nvPr>
-        </p:nvSpPr>
-        <p:spPr/>
-      </p:sp>
-      <p:sp>
-        <p:nvSpPr>
-          <p:cNvPr id="5" name="Tekst — symbol zastępczy 4"/>
-          <p:cNvSpPr>
-            <a:spLocks noGrp="1"/>
-          </p:cNvSpPr>
-          <p:nvPr>
-            <p:ph type="body" sz="half" idx="2"/>
-          </p:nvPr>
-        </p:nvSpPr>
-        <p:spPr/>
-        <p:txBody>
-          <a:bodyPr rtlCol="0"/>
-          <a:lstStyle/>
-          <a:p>
-            <a:pPr rtl="0"/>
-            <a:endParaRPr lang="pl-PL" dirty="0"/>
-          </a:p>
-        </p:txBody>
-      </p:sp>
-      <p:sp>
-        <p:nvSpPr>
-          <p:cNvPr id="6" name="Obraz — symbol zastępczy 5"/>
-          <p:cNvSpPr>
-            <a:spLocks noGrp="1"/>
-          </p:cNvSpPr>
-          <p:nvPr>
-            <p:ph type="pic" idx="13"/>
-          </p:nvPr>
-        </p:nvSpPr>
-        <p:spPr/>
-      </p:sp>
-      <p:sp>
-        <p:nvSpPr>
-          <p:cNvPr id="11" name="Tekst — symbol zastępczy 10"/>
-          <p:cNvSpPr>
-            <a:spLocks noGrp="1"/>
-          </p:cNvSpPr>
-          <p:nvPr>
-            <p:ph type="body" sz="half" idx="14"/>
-          </p:nvPr>
-        </p:nvSpPr>
-        <p:spPr/>
-        <p:txBody>
-          <a:bodyPr rtlCol="0"/>
-          <a:lstStyle/>
-          <a:p>
-            <a:pPr rtl="0"/>
-            <a:endParaRPr lang="pl-PL" dirty="0"/>
-          </a:p>
-        </p:txBody>
-      </p:sp>
-    </p:spTree>
-    <p:extLst>
-      <p:ext uri="{BB962C8B-B14F-4D97-AF65-F5344CB8AC3E}">
-        <p14:creationId xmlns:p14="http://schemas.microsoft.com/office/powerpoint/2010/main" val="188841400"/>
-      </p:ext>
-    </p:extLst>
-  </p:cSld>
-  <p:clrMapOvr>
-    <a:masterClrMapping/>
-  </p:clrMapOvr>
-  <mc:AlternateContent xmlns:mc="http://schemas.openxmlformats.org/markup-compatibility/2006" xmlns:p14="http://schemas.microsoft.com/office/powerpoint/2010/main">
-    <mc:Choice Requires="p14">
-      <p:transition spd="med" p14:dur="700">
-        <p:fade/>
-      </p:transition>
-    </mc:Choice>
-    <mc:Fallback xmlns="">
-      <p:transition spd="med">
-        <p:fade/>
-      </p:transition>
-    </mc:Fallback>
-  </mc:AlternateContent>
+  <p:transition spd="slow">
+    <p:push dir="u"/>
+  </p:transition>
 </p:sld>
 </file>
 
@@ -9790,7 +9147,7 @@
           <a:p>
             <a:pPr rtl="0"/>
             <a:r>
-              <a:rPr lang="pl-PL" sz="2800" dirty="0"/>
+              <a:rPr lang="pl-PL" sz="2800" b="1" dirty="0"/>
               <a:t>Brak takiego produktu na rynku &gt;&gt; wypełnienie luki.</a:t>
             </a:r>
           </a:p>
@@ -9823,7 +9180,11 @@
             </a:pPr>
             <a:r>
               <a:rPr lang="pl-PL" sz="2800" dirty="0"/>
-              <a:t>   	Zmiany dotyczą między innymi prowadzenia 	 kart 	profilaktycznego badania ucznia w wersji cyfrowej.</a:t>
+              <a:t>   	</a:t>
+            </a:r>
+            <a:r>
+              <a:rPr lang="pl-PL" sz="2000" dirty="0"/>
+              <a:t>Zmiany dotyczą między innymi prowadzenia kart profilaktycznego 	badania ucznia w wersji cyfrowej.</a:t>
             </a:r>
           </a:p>
           <a:p>
@@ -9848,18 +9209,9 @@
   <p:clrMapOvr>
     <a:masterClrMapping/>
   </p:clrMapOvr>
-  <mc:AlternateContent xmlns:mc="http://schemas.openxmlformats.org/markup-compatibility/2006" xmlns:p14="http://schemas.microsoft.com/office/powerpoint/2010/main">
-    <mc:Choice Requires="p14">
-      <p:transition spd="med" p14:dur="700">
-        <p:fade/>
-      </p:transition>
-    </mc:Choice>
-    <mc:Fallback xmlns="">
-      <p:transition spd="med">
-        <p:fade/>
-      </p:transition>
-    </mc:Fallback>
-  </mc:AlternateContent>
+  <p:transition spd="slow">
+    <p:push dir="u"/>
+  </p:transition>
 </p:sld>
 </file>
 
@@ -9887,7 +9239,7 @@
             <a:spLocks noGrp="1"/>
           </p:cNvSpPr>
           <p:nvPr>
-            <p:ph type="title"/>
+            <p:ph type="ctrTitle"/>
           </p:nvPr>
         </p:nvSpPr>
         <p:spPr/>
@@ -9898,19 +9250,19 @@
             <a:pPr rtl="0"/>
             <a:r>
               <a:rPr lang="pl-PL" dirty="0"/>
-              <a:t>Układ Dwa elementy zawartości z tabelą</a:t>
-            </a:r>
-          </a:p>
-        </p:txBody>
-      </p:sp>
-      <p:sp>
-        <p:nvSpPr>
-          <p:cNvPr id="3" name="Zawartość — symbol zastępczy 2"/>
-          <p:cNvSpPr>
-            <a:spLocks noGrp="1"/>
-          </p:cNvSpPr>
-          <p:nvPr>
-            <p:ph sz="half" idx="1"/>
+              <a:t>Możliwe rozwiązania biznesowe</a:t>
+            </a:r>
+          </a:p>
+        </p:txBody>
+      </p:sp>
+      <p:sp>
+        <p:nvSpPr>
+          <p:cNvPr id="4" name="Podtytuł 3"/>
+          <p:cNvSpPr>
+            <a:spLocks noGrp="1"/>
+          </p:cNvSpPr>
+          <p:nvPr>
+            <p:ph type="subTitle" idx="1"/>
           </p:nvPr>
         </p:nvSpPr>
         <p:spPr/>
@@ -9921,310 +9273,24 @@
             <a:pPr rtl="0"/>
             <a:r>
               <a:rPr lang="pl-PL" dirty="0"/>
-              <a:t>Tutaj dodaj pierwszy </a:t>
-            </a:r>
-            <a:r>
-              <a:rPr lang="pl-PL" dirty="0" err="1"/>
-              <a:t>punktor</a:t>
-            </a:r>
-            <a:endParaRPr lang="pl-PL" dirty="0"/>
-          </a:p>
-          <a:p>
-            <a:pPr rtl="0"/>
-            <a:r>
-              <a:rPr lang="pl-PL" dirty="0"/>
-              <a:t>Tutaj dodaj drugi </a:t>
-            </a:r>
-            <a:r>
-              <a:rPr lang="pl-PL" dirty="0" err="1"/>
-              <a:t>punktor</a:t>
-            </a:r>
-            <a:endParaRPr lang="pl-PL" dirty="0"/>
-          </a:p>
-          <a:p>
-            <a:pPr rtl="0"/>
-            <a:r>
-              <a:rPr lang="pl-PL" dirty="0"/>
-              <a:t>Tutaj dodaj trzeci </a:t>
-            </a:r>
-            <a:r>
-              <a:rPr lang="pl-PL" dirty="0" err="1"/>
-              <a:t>punktor</a:t>
-            </a:r>
-            <a:endParaRPr lang="pl-PL" dirty="0"/>
-          </a:p>
-        </p:txBody>
-      </p:sp>
-      <p:graphicFrame>
-        <p:nvGraphicFramePr>
-          <p:cNvPr id="5" name="Zawartość — symbol zastępczy 4"/>
-          <p:cNvGraphicFramePr>
-            <a:graphicFrameLocks noGrp="1"/>
-          </p:cNvGraphicFramePr>
-          <p:nvPr>
-            <p:ph sz="half" idx="2"/>
-            <p:extLst>
-              <p:ext uri="{D42A27DB-BD31-4B8C-83A1-F6EECF244321}">
-                <p14:modId xmlns:p14="http://schemas.microsoft.com/office/powerpoint/2010/main" val="4072835118"/>
-              </p:ext>
-            </p:extLst>
-          </p:nvPr>
-        </p:nvGraphicFramePr>
-        <p:xfrm>
-          <a:off x="6324600" y="1828800"/>
-          <a:ext cx="4572000" cy="2298700"/>
-        </p:xfrm>
-        <a:graphic>
-          <a:graphicData uri="http://schemas.openxmlformats.org/drawingml/2006/table">
-            <a:tbl>
-              <a:tblPr firstRow="1" bandRow="1">
-                <a:tableStyleId>{C4B1156A-380E-4F78-BDF5-A606A8083BF9}</a:tableStyleId>
-              </a:tblPr>
-              <a:tblGrid>
-                <a:gridCol w="1524000">
-                  <a:extLst>
-                    <a:ext uri="{9D8B030D-6E8A-4147-A177-3AD203B41FA5}">
-                      <a16:colId xmlns:a16="http://schemas.microsoft.com/office/drawing/2014/main" val="20000"/>
-                    </a:ext>
-                  </a:extLst>
-                </a:gridCol>
-                <a:gridCol w="1524000">
-                  <a:extLst>
-                    <a:ext uri="{9D8B030D-6E8A-4147-A177-3AD203B41FA5}">
-                      <a16:colId xmlns:a16="http://schemas.microsoft.com/office/drawing/2014/main" val="20001"/>
-                    </a:ext>
-                  </a:extLst>
-                </a:gridCol>
-                <a:gridCol w="1524000">
-                  <a:extLst>
-                    <a:ext uri="{9D8B030D-6E8A-4147-A177-3AD203B41FA5}">
-                      <a16:colId xmlns:a16="http://schemas.microsoft.com/office/drawing/2014/main" val="20002"/>
-                    </a:ext>
-                  </a:extLst>
-                </a:gridCol>
-              </a:tblGrid>
-              <a:tr h="574675">
-                <a:tc>
-                  <a:txBody>
-                    <a:bodyPr/>
-                    <a:lstStyle/>
-                    <a:p>
-                      <a:pPr algn="ctr" rtl="0"/>
-                      <a:r>
-                        <a:rPr lang="pl-PL" noProof="0" dirty="0"/>
-                        <a:t>Klasa</a:t>
-                      </a:r>
-                    </a:p>
-                  </a:txBody>
-                  <a:tcPr anchor="ctr"/>
-                </a:tc>
-                <a:tc>
-                  <a:txBody>
-                    <a:bodyPr/>
-                    <a:lstStyle/>
-                    <a:p>
-                      <a:pPr algn="ctr" rtl="0"/>
-                      <a:r>
-                        <a:rPr lang="pl-PL" noProof="0" dirty="0"/>
-                        <a:t>Grupa A</a:t>
-                      </a:r>
-                    </a:p>
-                  </a:txBody>
-                  <a:tcPr anchor="ctr"/>
-                </a:tc>
-                <a:tc>
-                  <a:txBody>
-                    <a:bodyPr/>
-                    <a:lstStyle/>
-                    <a:p>
-                      <a:pPr algn="ctr" rtl="0"/>
-                      <a:r>
-                        <a:rPr lang="pl-PL" noProof="0" dirty="0"/>
-                        <a:t>Grupa B</a:t>
-                      </a:r>
-                    </a:p>
-                  </a:txBody>
-                  <a:tcPr anchor="ctr"/>
-                </a:tc>
-                <a:extLst>
-                  <a:ext uri="{0D108BD9-81ED-4DB2-BD59-A6C34878D82A}">
-                    <a16:rowId xmlns:a16="http://schemas.microsoft.com/office/drawing/2014/main" val="10000"/>
-                  </a:ext>
-                </a:extLst>
-              </a:tr>
-              <a:tr h="574675">
-                <a:tc>
-                  <a:txBody>
-                    <a:bodyPr/>
-                    <a:lstStyle/>
-                    <a:p>
-                      <a:pPr algn="ctr" rtl="0"/>
-                      <a:r>
-                        <a:rPr lang="pl-PL" noProof="0" dirty="0"/>
-                        <a:t>Klasa 1</a:t>
-                      </a:r>
-                    </a:p>
-                  </a:txBody>
-                  <a:tcPr anchor="ctr"/>
-                </a:tc>
-                <a:tc>
-                  <a:txBody>
-                    <a:bodyPr/>
-                    <a:lstStyle/>
-                    <a:p>
-                      <a:pPr algn="ctr" rtl="0"/>
-                      <a:r>
-                        <a:rPr lang="pl-PL" noProof="0" dirty="0"/>
-                        <a:t>82</a:t>
-                      </a:r>
-                    </a:p>
-                  </a:txBody>
-                  <a:tcPr anchor="ctr"/>
-                </a:tc>
-                <a:tc>
-                  <a:txBody>
-                    <a:bodyPr/>
-                    <a:lstStyle/>
-                    <a:p>
-                      <a:pPr algn="ctr" rtl="0"/>
-                      <a:r>
-                        <a:rPr lang="pl-PL" noProof="0" dirty="0"/>
-                        <a:t>95</a:t>
-                      </a:r>
-                    </a:p>
-                  </a:txBody>
-                  <a:tcPr anchor="ctr"/>
-                </a:tc>
-                <a:extLst>
-                  <a:ext uri="{0D108BD9-81ED-4DB2-BD59-A6C34878D82A}">
-                    <a16:rowId xmlns:a16="http://schemas.microsoft.com/office/drawing/2014/main" val="10001"/>
-                  </a:ext>
-                </a:extLst>
-              </a:tr>
-              <a:tr h="574675">
-                <a:tc>
-                  <a:txBody>
-                    <a:bodyPr/>
-                    <a:lstStyle/>
-                    <a:p>
-                      <a:pPr algn="ctr" rtl="0"/>
-                      <a:r>
-                        <a:rPr lang="pl-PL" noProof="0" dirty="0"/>
-                        <a:t>Klasa 2</a:t>
-                      </a:r>
-                    </a:p>
-                  </a:txBody>
-                  <a:tcPr anchor="ctr"/>
-                </a:tc>
-                <a:tc>
-                  <a:txBody>
-                    <a:bodyPr/>
-                    <a:lstStyle/>
-                    <a:p>
-                      <a:pPr algn="ctr" rtl="0"/>
-                      <a:r>
-                        <a:rPr lang="pl-PL" noProof="0" dirty="0"/>
-                        <a:t>76</a:t>
-                      </a:r>
-                    </a:p>
-                  </a:txBody>
-                  <a:tcPr anchor="ctr"/>
-                </a:tc>
-                <a:tc>
-                  <a:txBody>
-                    <a:bodyPr/>
-                    <a:lstStyle/>
-                    <a:p>
-                      <a:pPr algn="ctr" rtl="0"/>
-                      <a:r>
-                        <a:rPr lang="pl-PL" noProof="0" dirty="0"/>
-                        <a:t>88</a:t>
-                      </a:r>
-                    </a:p>
-                  </a:txBody>
-                  <a:tcPr anchor="ctr"/>
-                </a:tc>
-                <a:extLst>
-                  <a:ext uri="{0D108BD9-81ED-4DB2-BD59-A6C34878D82A}">
-                    <a16:rowId xmlns:a16="http://schemas.microsoft.com/office/drawing/2014/main" val="10002"/>
-                  </a:ext>
-                </a:extLst>
-              </a:tr>
-              <a:tr h="574675">
-                <a:tc>
-                  <a:txBody>
-                    <a:bodyPr/>
-                    <a:lstStyle/>
-                    <a:p>
-                      <a:pPr algn="ctr" rtl="0"/>
-                      <a:r>
-                        <a:rPr lang="pl-PL" noProof="0" dirty="0"/>
-                        <a:t>Klasa 3</a:t>
-                      </a:r>
-                    </a:p>
-                  </a:txBody>
-                  <a:tcPr anchor="ctr"/>
-                </a:tc>
-                <a:tc>
-                  <a:txBody>
-                    <a:bodyPr/>
-                    <a:lstStyle/>
-                    <a:p>
-                      <a:pPr algn="ctr" rtl="0"/>
-                      <a:r>
-                        <a:rPr lang="pl-PL" noProof="0" dirty="0"/>
-                        <a:t>84</a:t>
-                      </a:r>
-                    </a:p>
-                  </a:txBody>
-                  <a:tcPr anchor="ctr"/>
-                </a:tc>
-                <a:tc>
-                  <a:txBody>
-                    <a:bodyPr/>
-                    <a:lstStyle/>
-                    <a:p>
-                      <a:pPr algn="ctr" rtl="0"/>
-                      <a:r>
-                        <a:rPr lang="pl-PL" noProof="0" dirty="0"/>
-                        <a:t>90</a:t>
-                      </a:r>
-                    </a:p>
-                  </a:txBody>
-                  <a:tcPr anchor="ctr"/>
-                </a:tc>
-                <a:extLst>
-                  <a:ext uri="{0D108BD9-81ED-4DB2-BD59-A6C34878D82A}">
-                    <a16:rowId xmlns:a16="http://schemas.microsoft.com/office/drawing/2014/main" val="10003"/>
-                  </a:ext>
-                </a:extLst>
-              </a:tr>
-            </a:tbl>
-          </a:graphicData>
-        </a:graphic>
-      </p:graphicFrame>
+              <a:t>Metodyka PRINCE2</a:t>
+            </a:r>
+          </a:p>
+        </p:txBody>
+      </p:sp>
     </p:spTree>
     <p:extLst>
       <p:ext uri="{BB962C8B-B14F-4D97-AF65-F5344CB8AC3E}">
-        <p14:creationId xmlns:p14="http://schemas.microsoft.com/office/powerpoint/2010/main" val="4213855386"/>
+        <p14:creationId xmlns:p14="http://schemas.microsoft.com/office/powerpoint/2010/main" val="1636679273"/>
       </p:ext>
     </p:extLst>
   </p:cSld>
   <p:clrMapOvr>
     <a:masterClrMapping/>
   </p:clrMapOvr>
-  <mc:AlternateContent xmlns:mc="http://schemas.openxmlformats.org/markup-compatibility/2006" xmlns:p14="http://schemas.microsoft.com/office/powerpoint/2010/main">
-    <mc:Choice Requires="p14">
-      <p:transition spd="med" p14:dur="700">
-        <p:fade/>
-      </p:transition>
-    </mc:Choice>
-    <mc:Fallback xmlns="">
-      <p:transition spd="med">
-        <p:fade/>
-      </p:transition>
-    </mc:Fallback>
-  </mc:AlternateContent>
+  <p:transition spd="slow">
+    <p:push dir="u"/>
+  </p:transition>
 </p:sld>
 </file>
 
@@ -10260,66 +9326,578 @@
           <a:bodyPr rtlCol="0"/>
           <a:lstStyle/>
           <a:p>
-            <a:pPr rtl="0"/>
+            <a:pPr algn="ctr" rtl="0"/>
             <a:r>
               <a:rPr lang="pl-PL" dirty="0"/>
-              <a:t>Układ Tytuł i zawartość z grafiką </a:t>
-            </a:r>
-            <a:r>
-              <a:rPr lang="pl-PL" dirty="0" err="1"/>
-              <a:t>SmartArt</a:t>
-            </a:r>
-            <a:endParaRPr lang="pl-PL" dirty="0"/>
-          </a:p>
-        </p:txBody>
-      </p:sp>
-      <p:graphicFrame>
-        <p:nvGraphicFramePr>
-          <p:cNvPr id="6" name="Zawartość — symbol zastępczy 5" descr="Diagram Podstawowy proces pagonowy przedstawiający 4 kroki rozmieszczone od lewej do prawej"/>
-          <p:cNvGraphicFramePr>
-            <a:graphicFrameLocks noGrp="1"/>
-          </p:cNvGraphicFramePr>
-          <p:nvPr>
-            <p:ph idx="1"/>
-            <p:extLst>
-              <p:ext uri="{D42A27DB-BD31-4B8C-83A1-F6EECF244321}">
-                <p14:modId xmlns:p14="http://schemas.microsoft.com/office/powerpoint/2010/main" val="464442317"/>
-              </p:ext>
-            </p:extLst>
-          </p:nvPr>
-        </p:nvGraphicFramePr>
-        <p:xfrm>
-          <a:off x="1295400" y="1828800"/>
-          <a:ext cx="9601200" cy="4343400"/>
-        </p:xfrm>
-        <a:graphic>
-          <a:graphicData uri="http://schemas.openxmlformats.org/drawingml/2006/diagram">
-            <dgm:relIds xmlns:dgm="http://schemas.openxmlformats.org/drawingml/2006/diagram" xmlns:r="http://schemas.openxmlformats.org/officeDocument/2006/relationships" r:dm="rId3" r:lo="rId4" r:qs="rId5" r:cs="rId6"/>
-          </a:graphicData>
-        </a:graphic>
-      </p:graphicFrame>
+              <a:t>Trzy podstawowe opcje</a:t>
+            </a:r>
+          </a:p>
+        </p:txBody>
+      </p:sp>
+      <p:sp>
+        <p:nvSpPr>
+          <p:cNvPr id="4" name="Symbol zastępczy tekstu 3">
+            <a:extLst>
+              <a:ext uri="{FF2B5EF4-FFF2-40B4-BE49-F238E27FC236}">
+                <a16:creationId xmlns:a16="http://schemas.microsoft.com/office/drawing/2014/main" id="{DFE3FEFB-A77A-1D8F-C139-F4A54EBEE216}"/>
+              </a:ext>
+            </a:extLst>
+          </p:cNvPr>
+          <p:cNvSpPr>
+            <a:spLocks noGrp="1"/>
+          </p:cNvSpPr>
+          <p:nvPr>
+            <p:ph type="body" idx="1"/>
+          </p:nvPr>
+        </p:nvSpPr>
+        <p:spPr>
+          <a:xfrm>
+            <a:off x="765110" y="2043405"/>
+            <a:ext cx="2950029" cy="850392"/>
+          </a:xfrm>
+        </p:spPr>
+        <p:txBody>
+          <a:bodyPr>
+            <a:normAutofit/>
+          </a:bodyPr>
+          <a:lstStyle/>
+          <a:p>
+            <a:pPr algn="ctr"/>
+            <a:r>
+              <a:rPr lang="pl-PL" sz="2800" dirty="0"/>
+              <a:t>1. Nic nie robić</a:t>
+            </a:r>
+          </a:p>
+        </p:txBody>
+      </p:sp>
+      <p:sp>
+        <p:nvSpPr>
+          <p:cNvPr id="5" name="Symbol zastępczy zawartości 4">
+            <a:extLst>
+              <a:ext uri="{FF2B5EF4-FFF2-40B4-BE49-F238E27FC236}">
+                <a16:creationId xmlns:a16="http://schemas.microsoft.com/office/drawing/2014/main" id="{06343BE3-A97F-E799-62C3-D108671062E9}"/>
+              </a:ext>
+            </a:extLst>
+          </p:cNvPr>
+          <p:cNvSpPr>
+            <a:spLocks noGrp="1"/>
+          </p:cNvSpPr>
+          <p:nvPr>
+            <p:ph sz="half" idx="2"/>
+          </p:nvPr>
+        </p:nvSpPr>
+        <p:spPr>
+          <a:xfrm>
+            <a:off x="765110" y="2919705"/>
+            <a:ext cx="2950028" cy="3467100"/>
+          </a:xfrm>
+        </p:spPr>
+        <p:txBody>
+          <a:bodyPr/>
+          <a:lstStyle/>
+          <a:p>
+            <a:pPr marL="0" indent="0" algn="ctr">
+              <a:buNone/>
+            </a:pPr>
+            <a:r>
+              <a:rPr lang="pl-PL" dirty="0"/>
+              <a:t>Brak realizacji systemu do gabinetów pielęgniarek w szkołach i zostanie przy obecnych rozwiązaniach.</a:t>
+            </a:r>
+          </a:p>
+        </p:txBody>
+      </p:sp>
+      <p:sp>
+        <p:nvSpPr>
+          <p:cNvPr id="6" name="Symbol zastępczy tekstu 5">
+            <a:extLst>
+              <a:ext uri="{FF2B5EF4-FFF2-40B4-BE49-F238E27FC236}">
+                <a16:creationId xmlns:a16="http://schemas.microsoft.com/office/drawing/2014/main" id="{874EB7A1-A5B4-2D06-8003-524315CEF70D}"/>
+              </a:ext>
+            </a:extLst>
+          </p:cNvPr>
+          <p:cNvSpPr>
+            <a:spLocks noGrp="1"/>
+          </p:cNvSpPr>
+          <p:nvPr>
+            <p:ph type="body" sz="quarter" idx="3"/>
+          </p:nvPr>
+        </p:nvSpPr>
+        <p:spPr>
+          <a:xfrm>
+            <a:off x="4523791" y="2043405"/>
+            <a:ext cx="2950029" cy="847725"/>
+          </a:xfrm>
+        </p:spPr>
+        <p:txBody>
+          <a:bodyPr>
+            <a:noAutofit/>
+          </a:bodyPr>
+          <a:lstStyle/>
+          <a:p>
+            <a:pPr algn="ctr"/>
+            <a:r>
+              <a:rPr lang="pl-PL" sz="2800" dirty="0"/>
+              <a:t>2. Ograniczyć się do minimum</a:t>
+            </a:r>
+          </a:p>
+        </p:txBody>
+      </p:sp>
+      <p:sp>
+        <p:nvSpPr>
+          <p:cNvPr id="7" name="Symbol zastępczy zawartości 6">
+            <a:extLst>
+              <a:ext uri="{FF2B5EF4-FFF2-40B4-BE49-F238E27FC236}">
+                <a16:creationId xmlns:a16="http://schemas.microsoft.com/office/drawing/2014/main" id="{81860D28-5B34-F97F-2E6D-DF3EECC7591C}"/>
+              </a:ext>
+            </a:extLst>
+          </p:cNvPr>
+          <p:cNvSpPr>
+            <a:spLocks noGrp="1"/>
+          </p:cNvSpPr>
+          <p:nvPr>
+            <p:ph sz="quarter" idx="4"/>
+          </p:nvPr>
+        </p:nvSpPr>
+        <p:spPr>
+          <a:xfrm>
+            <a:off x="4523791" y="2919705"/>
+            <a:ext cx="2950029" cy="3467100"/>
+          </a:xfrm>
+        </p:spPr>
+        <p:txBody>
+          <a:bodyPr/>
+          <a:lstStyle/>
+          <a:p>
+            <a:pPr marL="0" indent="0" algn="ctr">
+              <a:buNone/>
+            </a:pPr>
+            <a:r>
+              <a:rPr lang="pl-PL" dirty="0"/>
+              <a:t>Realizacja minimalnego zakresu funkcjonalnego systemu, ograniczenie się do usprawnienia procesu badań przesiewowych w szkołach.</a:t>
+            </a:r>
+          </a:p>
+        </p:txBody>
+      </p:sp>
+      <p:sp>
+        <p:nvSpPr>
+          <p:cNvPr id="8" name="Symbol zastępczy tekstu 5">
+            <a:extLst>
+              <a:ext uri="{FF2B5EF4-FFF2-40B4-BE49-F238E27FC236}">
+                <a16:creationId xmlns:a16="http://schemas.microsoft.com/office/drawing/2014/main" id="{325368AA-FFBA-D5C5-5CB3-D8D12F4282FC}"/>
+              </a:ext>
+            </a:extLst>
+          </p:cNvPr>
+          <p:cNvSpPr txBox="1">
+            <a:spLocks/>
+          </p:cNvSpPr>
+          <p:nvPr/>
+        </p:nvSpPr>
+        <p:spPr>
+          <a:xfrm>
+            <a:off x="8282473" y="2043405"/>
+            <a:ext cx="2950029" cy="847725"/>
+          </a:xfrm>
+          <a:prstGeom prst="rect">
+            <a:avLst/>
+          </a:prstGeom>
+        </p:spPr>
+        <p:txBody>
+          <a:bodyPr vert="horz" lIns="91440" tIns="45720" rIns="91440" bIns="45720" rtlCol="0" anchor="ctr">
+            <a:noAutofit/>
+          </a:bodyPr>
+          <a:lstStyle>
+            <a:lvl1pPr marL="0" indent="0" algn="l" defTabSz="914400" rtl="0" eaLnBrk="1" latinLnBrk="0" hangingPunct="1">
+              <a:lnSpc>
+                <a:spcPct val="90000"/>
+              </a:lnSpc>
+              <a:spcBef>
+                <a:spcPts val="1800"/>
+              </a:spcBef>
+              <a:buFont typeface="Arial" panose="020B0604020202020204" pitchFamily="34" charset="0"/>
+              <a:buNone/>
+              <a:defRPr sz="2600" b="0" kern="1200">
+                <a:solidFill>
+                  <a:schemeClr val="tx1"/>
+                </a:solidFill>
+                <a:latin typeface="+mn-lt"/>
+                <a:ea typeface="+mn-ea"/>
+                <a:cs typeface="+mn-cs"/>
+              </a:defRPr>
+            </a:lvl1pPr>
+            <a:lvl2pPr marL="457200" indent="0" algn="l" defTabSz="914400" rtl="0" eaLnBrk="1" latinLnBrk="0" hangingPunct="1">
+              <a:lnSpc>
+                <a:spcPct val="90000"/>
+              </a:lnSpc>
+              <a:spcBef>
+                <a:spcPts val="1000"/>
+              </a:spcBef>
+              <a:buFont typeface="Arial" panose="020B0604020202020204" pitchFamily="34" charset="0"/>
+              <a:buNone/>
+              <a:defRPr sz="2000" b="1" kern="1200">
+                <a:solidFill>
+                  <a:schemeClr val="tx1"/>
+                </a:solidFill>
+                <a:latin typeface="+mn-lt"/>
+                <a:ea typeface="+mn-ea"/>
+                <a:cs typeface="+mn-cs"/>
+              </a:defRPr>
+            </a:lvl2pPr>
+            <a:lvl3pPr marL="914400" indent="0" algn="l" defTabSz="914400" rtl="0" eaLnBrk="1" latinLnBrk="0" hangingPunct="1">
+              <a:lnSpc>
+                <a:spcPct val="90000"/>
+              </a:lnSpc>
+              <a:spcBef>
+                <a:spcPts val="800"/>
+              </a:spcBef>
+              <a:buFont typeface="Arial" panose="020B0604020202020204" pitchFamily="34" charset="0"/>
+              <a:buNone/>
+              <a:defRPr sz="1800" b="1" kern="1200">
+                <a:solidFill>
+                  <a:schemeClr val="tx1"/>
+                </a:solidFill>
+                <a:latin typeface="+mn-lt"/>
+                <a:ea typeface="+mn-ea"/>
+                <a:cs typeface="+mn-cs"/>
+              </a:defRPr>
+            </a:lvl3pPr>
+            <a:lvl4pPr marL="1371600" indent="0" algn="l" defTabSz="914400" rtl="0" eaLnBrk="1" latinLnBrk="0" hangingPunct="1">
+              <a:lnSpc>
+                <a:spcPct val="90000"/>
+              </a:lnSpc>
+              <a:spcBef>
+                <a:spcPts val="800"/>
+              </a:spcBef>
+              <a:buFont typeface="Arial" panose="020B0604020202020204" pitchFamily="34" charset="0"/>
+              <a:buNone/>
+              <a:defRPr sz="1600" b="1" kern="1200">
+                <a:solidFill>
+                  <a:schemeClr val="tx1"/>
+                </a:solidFill>
+                <a:latin typeface="+mn-lt"/>
+                <a:ea typeface="+mn-ea"/>
+                <a:cs typeface="+mn-cs"/>
+              </a:defRPr>
+            </a:lvl4pPr>
+            <a:lvl5pPr marL="1828800" indent="0" algn="l" defTabSz="914400" rtl="0" eaLnBrk="1" latinLnBrk="0" hangingPunct="1">
+              <a:lnSpc>
+                <a:spcPct val="90000"/>
+              </a:lnSpc>
+              <a:spcBef>
+                <a:spcPts val="800"/>
+              </a:spcBef>
+              <a:buFont typeface="Arial" panose="020B0604020202020204" pitchFamily="34" charset="0"/>
+              <a:buNone/>
+              <a:defRPr sz="1600" b="1" kern="1200">
+                <a:solidFill>
+                  <a:schemeClr val="tx1"/>
+                </a:solidFill>
+                <a:latin typeface="+mn-lt"/>
+                <a:ea typeface="+mn-ea"/>
+                <a:cs typeface="+mn-cs"/>
+              </a:defRPr>
+            </a:lvl5pPr>
+            <a:lvl6pPr marL="2286000" indent="0" algn="l" defTabSz="914400" rtl="0" eaLnBrk="1" latinLnBrk="0" hangingPunct="1">
+              <a:lnSpc>
+                <a:spcPct val="90000"/>
+              </a:lnSpc>
+              <a:spcBef>
+                <a:spcPts val="800"/>
+              </a:spcBef>
+              <a:buFont typeface="Arial" panose="020B0604020202020204" pitchFamily="34" charset="0"/>
+              <a:buNone/>
+              <a:defRPr sz="1600" b="1" kern="1200">
+                <a:solidFill>
+                  <a:schemeClr val="tx1"/>
+                </a:solidFill>
+                <a:latin typeface="+mn-lt"/>
+                <a:ea typeface="+mn-ea"/>
+                <a:cs typeface="+mn-cs"/>
+              </a:defRPr>
+            </a:lvl6pPr>
+            <a:lvl7pPr marL="2743200" indent="0" algn="l" defTabSz="914400" rtl="0" eaLnBrk="1" latinLnBrk="0" hangingPunct="1">
+              <a:lnSpc>
+                <a:spcPct val="90000"/>
+              </a:lnSpc>
+              <a:spcBef>
+                <a:spcPts val="800"/>
+              </a:spcBef>
+              <a:buFont typeface="Arial" panose="020B0604020202020204" pitchFamily="34" charset="0"/>
+              <a:buNone/>
+              <a:defRPr sz="1600" b="1" kern="1200">
+                <a:solidFill>
+                  <a:schemeClr val="tx1"/>
+                </a:solidFill>
+                <a:latin typeface="+mn-lt"/>
+                <a:ea typeface="+mn-ea"/>
+                <a:cs typeface="+mn-cs"/>
+              </a:defRPr>
+            </a:lvl7pPr>
+            <a:lvl8pPr marL="3200400" indent="0" algn="l" defTabSz="914400" rtl="0" eaLnBrk="1" latinLnBrk="0" hangingPunct="1">
+              <a:lnSpc>
+                <a:spcPct val="90000"/>
+              </a:lnSpc>
+              <a:spcBef>
+                <a:spcPts val="800"/>
+              </a:spcBef>
+              <a:buFont typeface="Arial" panose="020B0604020202020204" pitchFamily="34" charset="0"/>
+              <a:buNone/>
+              <a:defRPr sz="1600" b="1" kern="1200">
+                <a:solidFill>
+                  <a:schemeClr val="tx1"/>
+                </a:solidFill>
+                <a:latin typeface="+mn-lt"/>
+                <a:ea typeface="+mn-ea"/>
+                <a:cs typeface="+mn-cs"/>
+              </a:defRPr>
+            </a:lvl8pPr>
+            <a:lvl9pPr marL="3657600" indent="0" algn="l" defTabSz="914400" rtl="0" eaLnBrk="1" latinLnBrk="0" hangingPunct="1">
+              <a:lnSpc>
+                <a:spcPct val="90000"/>
+              </a:lnSpc>
+              <a:spcBef>
+                <a:spcPts val="800"/>
+              </a:spcBef>
+              <a:buFont typeface="Arial" panose="020B0604020202020204" pitchFamily="34" charset="0"/>
+              <a:buNone/>
+              <a:defRPr sz="1600" b="1" kern="1200">
+                <a:solidFill>
+                  <a:schemeClr val="tx1"/>
+                </a:solidFill>
+                <a:latin typeface="+mn-lt"/>
+                <a:ea typeface="+mn-ea"/>
+                <a:cs typeface="+mn-cs"/>
+              </a:defRPr>
+            </a:lvl9pPr>
+          </a:lstStyle>
+          <a:p>
+            <a:pPr algn="ctr"/>
+            <a:r>
+              <a:rPr lang="pl-PL" sz="2800" dirty="0"/>
+              <a:t>3. </a:t>
+            </a:r>
+            <a:r>
+              <a:rPr lang="pl-PL" sz="2800" b="1" u="sng" dirty="0"/>
+              <a:t>Zrobić coś ponad minimum</a:t>
+            </a:r>
+          </a:p>
+        </p:txBody>
+      </p:sp>
+      <p:sp>
+        <p:nvSpPr>
+          <p:cNvPr id="10" name="Symbol zastępczy zawartości 6">
+            <a:extLst>
+              <a:ext uri="{FF2B5EF4-FFF2-40B4-BE49-F238E27FC236}">
+                <a16:creationId xmlns:a16="http://schemas.microsoft.com/office/drawing/2014/main" id="{71915740-F81F-2895-1D14-94C85A517CA6}"/>
+              </a:ext>
+            </a:extLst>
+          </p:cNvPr>
+          <p:cNvSpPr txBox="1">
+            <a:spLocks/>
+          </p:cNvSpPr>
+          <p:nvPr/>
+        </p:nvSpPr>
+        <p:spPr>
+          <a:xfrm>
+            <a:off x="8282473" y="2919705"/>
+            <a:ext cx="2950029" cy="3467100"/>
+          </a:xfrm>
+          <a:prstGeom prst="rect">
+            <a:avLst/>
+          </a:prstGeom>
+        </p:spPr>
+        <p:txBody>
+          <a:bodyPr vert="horz" lIns="91440" tIns="45720" rIns="91440" bIns="45720" rtlCol="0">
+            <a:normAutofit/>
+          </a:bodyPr>
+          <a:lstStyle>
+            <a:lvl1pPr marL="274320" indent="-274320" algn="l" defTabSz="914400" rtl="0" eaLnBrk="1" latinLnBrk="0" hangingPunct="1">
+              <a:lnSpc>
+                <a:spcPct val="90000"/>
+              </a:lnSpc>
+              <a:spcBef>
+                <a:spcPts val="1800"/>
+              </a:spcBef>
+              <a:buFont typeface="Arial" panose="020B0604020202020204" pitchFamily="34" charset="0"/>
+              <a:buChar char="•"/>
+              <a:defRPr sz="2400" kern="1200">
+                <a:solidFill>
+                  <a:schemeClr val="tx1"/>
+                </a:solidFill>
+                <a:latin typeface="+mn-lt"/>
+                <a:ea typeface="+mn-ea"/>
+                <a:cs typeface="+mn-cs"/>
+              </a:defRPr>
+            </a:lvl1pPr>
+            <a:lvl2pPr marL="548640" indent="-228600" algn="l" defTabSz="914400" rtl="0" eaLnBrk="1" latinLnBrk="0" hangingPunct="1">
+              <a:lnSpc>
+                <a:spcPct val="90000"/>
+              </a:lnSpc>
+              <a:spcBef>
+                <a:spcPts val="1000"/>
+              </a:spcBef>
+              <a:buFont typeface="Arial" panose="020B0604020202020204" pitchFamily="34" charset="0"/>
+              <a:buChar char="•"/>
+              <a:defRPr sz="2000" kern="1200">
+                <a:solidFill>
+                  <a:schemeClr val="tx1"/>
+                </a:solidFill>
+                <a:latin typeface="+mn-lt"/>
+                <a:ea typeface="+mn-ea"/>
+                <a:cs typeface="+mn-cs"/>
+              </a:defRPr>
+            </a:lvl2pPr>
+            <a:lvl3pPr marL="822960" indent="-228600" algn="l" defTabSz="914400" rtl="0" eaLnBrk="1" latinLnBrk="0" hangingPunct="1">
+              <a:lnSpc>
+                <a:spcPct val="90000"/>
+              </a:lnSpc>
+              <a:spcBef>
+                <a:spcPts val="800"/>
+              </a:spcBef>
+              <a:buFont typeface="Arial" panose="020B0604020202020204" pitchFamily="34" charset="0"/>
+              <a:buChar char="•"/>
+              <a:defRPr sz="1800" kern="1200">
+                <a:solidFill>
+                  <a:schemeClr val="tx1"/>
+                </a:solidFill>
+                <a:latin typeface="+mn-lt"/>
+                <a:ea typeface="+mn-ea"/>
+                <a:cs typeface="+mn-cs"/>
+              </a:defRPr>
+            </a:lvl3pPr>
+            <a:lvl4pPr marL="1097280" indent="-228600" algn="l" defTabSz="914400" rtl="0" eaLnBrk="1" latinLnBrk="0" hangingPunct="1">
+              <a:lnSpc>
+                <a:spcPct val="90000"/>
+              </a:lnSpc>
+              <a:spcBef>
+                <a:spcPts val="800"/>
+              </a:spcBef>
+              <a:buFont typeface="Arial" panose="020B0604020202020204" pitchFamily="34" charset="0"/>
+              <a:buChar char="•"/>
+              <a:defRPr sz="1600" kern="1200">
+                <a:solidFill>
+                  <a:schemeClr val="tx1"/>
+                </a:solidFill>
+                <a:latin typeface="+mn-lt"/>
+                <a:ea typeface="+mn-ea"/>
+                <a:cs typeface="+mn-cs"/>
+              </a:defRPr>
+            </a:lvl4pPr>
+            <a:lvl5pPr marL="1325880" indent="-228600" algn="l" defTabSz="914400" rtl="0" eaLnBrk="1" latinLnBrk="0" hangingPunct="1">
+              <a:lnSpc>
+                <a:spcPct val="90000"/>
+              </a:lnSpc>
+              <a:spcBef>
+                <a:spcPts val="800"/>
+              </a:spcBef>
+              <a:buFont typeface="Arial" panose="020B0604020202020204" pitchFamily="34" charset="0"/>
+              <a:buChar char="•"/>
+              <a:defRPr sz="1600" kern="1200">
+                <a:solidFill>
+                  <a:schemeClr val="tx1"/>
+                </a:solidFill>
+                <a:latin typeface="+mn-lt"/>
+                <a:ea typeface="+mn-ea"/>
+                <a:cs typeface="+mn-cs"/>
+              </a:defRPr>
+            </a:lvl5pPr>
+            <a:lvl6pPr marL="1554480" indent="-228600" algn="l" defTabSz="914400" rtl="0" eaLnBrk="1" latinLnBrk="0" hangingPunct="1">
+              <a:lnSpc>
+                <a:spcPct val="90000"/>
+              </a:lnSpc>
+              <a:spcBef>
+                <a:spcPts val="800"/>
+              </a:spcBef>
+              <a:buFont typeface="Arial" panose="020B0604020202020204" pitchFamily="34" charset="0"/>
+              <a:buChar char="•"/>
+              <a:defRPr sz="1600" kern="1200">
+                <a:solidFill>
+                  <a:schemeClr val="tx1"/>
+                </a:solidFill>
+                <a:latin typeface="+mn-lt"/>
+                <a:ea typeface="+mn-ea"/>
+                <a:cs typeface="+mn-cs"/>
+              </a:defRPr>
+            </a:lvl6pPr>
+            <a:lvl7pPr marL="1783080" indent="-228600" algn="l" defTabSz="914400" rtl="0" eaLnBrk="1" latinLnBrk="0" hangingPunct="1">
+              <a:lnSpc>
+                <a:spcPct val="90000"/>
+              </a:lnSpc>
+              <a:spcBef>
+                <a:spcPts val="800"/>
+              </a:spcBef>
+              <a:buFont typeface="Arial" panose="020B0604020202020204" pitchFamily="34" charset="0"/>
+              <a:buChar char="•"/>
+              <a:defRPr sz="1600" kern="1200">
+                <a:solidFill>
+                  <a:schemeClr val="tx1"/>
+                </a:solidFill>
+                <a:latin typeface="+mn-lt"/>
+                <a:ea typeface="+mn-ea"/>
+                <a:cs typeface="+mn-cs"/>
+              </a:defRPr>
+            </a:lvl7pPr>
+            <a:lvl8pPr marL="2011680" indent="-228600" algn="l" defTabSz="914400" rtl="0" eaLnBrk="1" latinLnBrk="0" hangingPunct="1">
+              <a:lnSpc>
+                <a:spcPct val="90000"/>
+              </a:lnSpc>
+              <a:spcBef>
+                <a:spcPts val="800"/>
+              </a:spcBef>
+              <a:buFont typeface="Arial" panose="020B0604020202020204" pitchFamily="34" charset="0"/>
+              <a:buChar char="•"/>
+              <a:defRPr sz="1600" kern="1200">
+                <a:solidFill>
+                  <a:schemeClr val="tx1"/>
+                </a:solidFill>
+                <a:latin typeface="+mn-lt"/>
+                <a:ea typeface="+mn-ea"/>
+                <a:cs typeface="+mn-cs"/>
+              </a:defRPr>
+            </a:lvl8pPr>
+            <a:lvl9pPr marL="2240280" indent="-228600" algn="l" defTabSz="914400" rtl="0" eaLnBrk="1" latinLnBrk="0" hangingPunct="1">
+              <a:lnSpc>
+                <a:spcPct val="90000"/>
+              </a:lnSpc>
+              <a:spcBef>
+                <a:spcPts val="800"/>
+              </a:spcBef>
+              <a:buFont typeface="Arial" panose="020B0604020202020204" pitchFamily="34" charset="0"/>
+              <a:buChar char="•"/>
+              <a:defRPr sz="1600" kern="1200">
+                <a:solidFill>
+                  <a:schemeClr val="tx1"/>
+                </a:solidFill>
+                <a:latin typeface="+mn-lt"/>
+                <a:ea typeface="+mn-ea"/>
+                <a:cs typeface="+mn-cs"/>
+              </a:defRPr>
+            </a:lvl9pPr>
+          </a:lstStyle>
+          <a:p>
+            <a:pPr marL="0" indent="0" algn="ctr">
+              <a:buFont typeface="Arial" panose="020B0604020202020204" pitchFamily="34" charset="0"/>
+              <a:buNone/>
+            </a:pPr>
+            <a:r>
+              <a:rPr lang="pl-PL" dirty="0"/>
+              <a:t>Realizacja projektu w pełnym zakresie funkcjonalności, m.in. możliwości drukowania dokumentów, przesyłania informacji rodzicom drogą e-mailową</a:t>
+            </a:r>
+          </a:p>
+        </p:txBody>
+      </p:sp>
     </p:spTree>
     <p:extLst>
       <p:ext uri="{BB962C8B-B14F-4D97-AF65-F5344CB8AC3E}">
-        <p14:creationId xmlns:p14="http://schemas.microsoft.com/office/powerpoint/2010/main" val="3112142608"/>
+        <p14:creationId xmlns:p14="http://schemas.microsoft.com/office/powerpoint/2010/main" val="737118897"/>
       </p:ext>
     </p:extLst>
   </p:cSld>
   <p:clrMapOvr>
     <a:masterClrMapping/>
   </p:clrMapOvr>
-  <mc:AlternateContent xmlns:mc="http://schemas.openxmlformats.org/markup-compatibility/2006" xmlns:p14="http://schemas.microsoft.com/office/powerpoint/2010/main">
-    <mc:Choice Requires="p14">
-      <p:transition spd="med" p14:dur="700">
-        <p:fade/>
-      </p:transition>
-    </mc:Choice>
-    <mc:Fallback xmlns="">
-      <p:transition spd="med">
-        <p:fade/>
-      </p:transition>
-    </mc:Fallback>
-  </mc:AlternateContent>
+  <p:transition spd="slow">
+    <p:push dir="u"/>
+  </p:transition>
 </p:sld>
 </file>
 
@@ -10347,7 +9925,7 @@
             <a:spLocks noGrp="1"/>
           </p:cNvSpPr>
           <p:nvPr>
-            <p:ph type="ctrTitle"/>
+            <p:ph type="title"/>
           </p:nvPr>
         </p:nvSpPr>
         <p:spPr/>
@@ -10358,48 +9936,80 @@
             <a:pPr rtl="0"/>
             <a:r>
               <a:rPr lang="pl-PL" dirty="0"/>
-              <a:t>Dodaj tytuł slajdu — 1</a:t>
-            </a:r>
-          </a:p>
-        </p:txBody>
-      </p:sp>
-      <p:sp>
-        <p:nvSpPr>
-          <p:cNvPr id="4" name="Podtytuł 3"/>
-          <p:cNvSpPr>
-            <a:spLocks noGrp="1"/>
-          </p:cNvSpPr>
-          <p:nvPr>
-            <p:ph type="subTitle" idx="1"/>
-          </p:nvPr>
-        </p:nvSpPr>
-        <p:spPr/>
-        <p:txBody>
-          <a:bodyPr rtlCol="0"/>
+              <a:t>3. </a:t>
+            </a:r>
+            <a:r>
+              <a:rPr lang="pl-PL" b="1" dirty="0"/>
+              <a:t>Zrobić coś ponad minimum</a:t>
+            </a:r>
+          </a:p>
+        </p:txBody>
+      </p:sp>
+      <p:sp>
+        <p:nvSpPr>
+          <p:cNvPr id="3" name="Symbol zastępczy zawartości 2">
+            <a:extLst>
+              <a:ext uri="{FF2B5EF4-FFF2-40B4-BE49-F238E27FC236}">
+                <a16:creationId xmlns:a16="http://schemas.microsoft.com/office/drawing/2014/main" id="{B2A7D207-CE5F-1C4C-53A9-20028E3F08A1}"/>
+              </a:ext>
+            </a:extLst>
+          </p:cNvPr>
+          <p:cNvSpPr>
+            <a:spLocks noGrp="1"/>
+          </p:cNvSpPr>
+          <p:nvPr>
+            <p:ph idx="1"/>
+          </p:nvPr>
+        </p:nvSpPr>
+        <p:spPr>
+          <a:xfrm>
+            <a:off x="1295400" y="1856792"/>
+            <a:ext cx="9601200" cy="4343400"/>
+          </a:xfrm>
+        </p:spPr>
+        <p:txBody>
+          <a:bodyPr/>
           <a:lstStyle/>
           <a:p>
-            <a:pPr rtl="0"/>
-            <a:endParaRPr lang="pl-PL" dirty="0"/>
+            <a:pPr algn="just"/>
+            <a:r>
+              <a:rPr lang="pl-PL" dirty="0"/>
+              <a:t>Wykonanie systemu, który usprawni pracę pielęgniarki w znacznym stopniu ma większe szanse na powodzenie na rynku.</a:t>
+            </a:r>
+          </a:p>
+          <a:p>
+            <a:pPr algn="just"/>
+            <a:r>
+              <a:rPr lang="pl-PL" dirty="0"/>
+              <a:t>Klient / użytkownik musi być zadowolony produktem na tyle, aby był chętny do przestawienia swojego trybu pracy na działania w nowym środowisku cyfrowym. Do osiągnięcia tego celu potrzebny jest system kompletny, który poprawi warunki pracy pielęgniarkom / pielęgniarzom i pozwoli im zaoszczędzić czas.</a:t>
+            </a:r>
+          </a:p>
+          <a:p>
+            <a:pPr algn="just"/>
+            <a:r>
+              <a:rPr lang="pl-PL" dirty="0"/>
+              <a:t>Jeśli produkt przyjmie się na rynku to jest szansa na pozyskanie ministerstwa zdrowia jako klienta i zaopatrzenie w system wszystkich szkół publicznych w Polsce. Następstwem takiej sytuacji byłyby ogromne zyski dla firmy.</a:t>
+            </a:r>
           </a:p>
         </p:txBody>
       </p:sp>
     </p:spTree>
     <p:extLst>
       <p:ext uri="{BB962C8B-B14F-4D97-AF65-F5344CB8AC3E}">
-        <p14:creationId xmlns:p14="http://schemas.microsoft.com/office/powerpoint/2010/main" val="1636679273"/>
+        <p14:creationId xmlns:p14="http://schemas.microsoft.com/office/powerpoint/2010/main" val="3061729273"/>
       </p:ext>
     </p:extLst>
   </p:cSld>
   <p:clrMapOvr>
     <a:masterClrMapping/>
   </p:clrMapOvr>
-  <mc:AlternateContent xmlns:mc="http://schemas.openxmlformats.org/markup-compatibility/2006" xmlns:p14="http://schemas.microsoft.com/office/powerpoint/2010/main">
-    <mc:Choice Requires="p14">
+  <mc:AlternateContent xmlns:mc="http://schemas.openxmlformats.org/markup-compatibility/2006">
+    <mc:Choice xmlns:p14="http://schemas.microsoft.com/office/powerpoint/2010/main" Requires="p14">
       <p:transition spd="med" p14:dur="700">
         <p:fade/>
       </p:transition>
     </mc:Choice>
-    <mc:Fallback xmlns="">
+    <mc:Fallback>
       <p:transition spd="med">
         <p:fade/>
       </p:transition>
@@ -10443,25 +10053,84 @@
             <a:pPr rtl="0"/>
             <a:r>
               <a:rPr lang="pl-PL" dirty="0"/>
-              <a:t>Dodaj tytuł slajdu — 2</a:t>
-            </a:r>
-          </a:p>
-        </p:txBody>
-      </p:sp>
-      <p:sp>
-        <p:nvSpPr>
-          <p:cNvPr id="4" name="Tekst — symbol zastępczy 3"/>
-          <p:cNvSpPr>
-            <a:spLocks noGrp="1"/>
-          </p:cNvSpPr>
-          <p:nvPr>
-            <p:ph type="body" idx="1"/>
-          </p:nvPr>
-        </p:nvSpPr>
-        <p:spPr/>
+              <a:t>Oczekiwane korzyści</a:t>
+            </a:r>
+          </a:p>
+        </p:txBody>
+      </p:sp>
+      <p:sp>
+        <p:nvSpPr>
+          <p:cNvPr id="5" name="Zawartość — symbol zastępczy 4"/>
+          <p:cNvSpPr>
+            <a:spLocks noGrp="1"/>
+          </p:cNvSpPr>
+          <p:nvPr>
+            <p:ph idx="1"/>
+          </p:nvPr>
+        </p:nvSpPr>
+        <p:spPr>
+          <a:xfrm>
+            <a:off x="1253489" y="1828800"/>
+            <a:ext cx="9601200" cy="4343400"/>
+          </a:xfrm>
+        </p:spPr>
         <p:txBody>
           <a:bodyPr rtlCol="0"/>
           <a:lstStyle/>
+          <a:p>
+            <a:pPr rtl="0"/>
+            <a:r>
+              <a:rPr lang="pl-PL" sz="2800" dirty="0"/>
+              <a:t>Wzrost przychodów o ponad 100%</a:t>
+            </a:r>
+          </a:p>
+          <a:p>
+            <a:pPr rtl="0"/>
+            <a:r>
+              <a:rPr lang="pl-PL" sz="2800" dirty="0"/>
+              <a:t>Pozyskanie nowych klientów:</a:t>
+            </a:r>
+          </a:p>
+          <a:p>
+            <a:pPr marL="777240" lvl="1" indent="-457200">
+              <a:buFont typeface="+mj-lt"/>
+              <a:buAutoNum type="arabicPeriod"/>
+            </a:pPr>
+            <a:r>
+              <a:rPr lang="pl-PL" sz="2400" dirty="0"/>
+              <a:t>Na początku szkoły prywatne w Szczecinie;</a:t>
+            </a:r>
+          </a:p>
+          <a:p>
+            <a:pPr marL="777240" lvl="1" indent="-457200">
+              <a:buFont typeface="+mj-lt"/>
+              <a:buAutoNum type="arabicPeriod"/>
+            </a:pPr>
+            <a:r>
+              <a:rPr lang="pl-PL" sz="2400" dirty="0"/>
+              <a:t>Następnie szkoły prywatne na terenie województwa Zachodniopomorskiego;</a:t>
+            </a:r>
+          </a:p>
+          <a:p>
+            <a:pPr marL="777240" lvl="1" indent="-457200">
+              <a:buFont typeface="+mj-lt"/>
+              <a:buAutoNum type="arabicPeriod"/>
+            </a:pPr>
+            <a:r>
+              <a:rPr lang="pl-PL" sz="2400" dirty="0"/>
+              <a:t>Następnie szkoły prywatne na terenie całej Polski;</a:t>
+            </a:r>
+          </a:p>
+          <a:p>
+            <a:pPr marL="777240" lvl="1" indent="-457200">
+              <a:buFont typeface="+mj-lt"/>
+              <a:buAutoNum type="arabicPeriod"/>
+            </a:pPr>
+            <a:r>
+              <a:rPr lang="pl-PL" sz="2400" dirty="0"/>
+              <a:t>Punktem końcowym oczekiwań jest umowa z Ministerstwem Zdrowia na dostarczenie systemu do wszystkich szkół publicznych na terenie Polski;</a:t>
+            </a:r>
+          </a:p>
           <a:p>
             <a:pPr rtl="0"/>
             <a:endParaRPr lang="pl-PL" dirty="0"/>
@@ -10471,25 +10140,16 @@
     </p:spTree>
     <p:extLst>
       <p:ext uri="{BB962C8B-B14F-4D97-AF65-F5344CB8AC3E}">
-        <p14:creationId xmlns:p14="http://schemas.microsoft.com/office/powerpoint/2010/main" val="3374778722"/>
+        <p14:creationId xmlns:p14="http://schemas.microsoft.com/office/powerpoint/2010/main" val="332843759"/>
       </p:ext>
     </p:extLst>
   </p:cSld>
   <p:clrMapOvr>
     <a:masterClrMapping/>
   </p:clrMapOvr>
-  <mc:AlternateContent xmlns:mc="http://schemas.openxmlformats.org/markup-compatibility/2006" xmlns:p14="http://schemas.microsoft.com/office/powerpoint/2010/main">
-    <mc:Choice Requires="p14">
-      <p:transition spd="med" p14:dur="700">
-        <p:fade/>
-      </p:transition>
-    </mc:Choice>
-    <mc:Fallback xmlns="">
-      <p:transition spd="med">
-        <p:fade/>
-      </p:transition>
-    </mc:Fallback>
-  </mc:AlternateContent>
+  <p:transition spd="slow">
+    <p:push dir="u"/>
+  </p:transition>
 </p:sld>
 </file>
 
@@ -10528,87 +10188,72 @@
             <a:pPr rtl="0"/>
             <a:r>
               <a:rPr lang="pl-PL" dirty="0"/>
-              <a:t>Dodaj tytuł slajdu — 3</a:t>
-            </a:r>
-          </a:p>
-        </p:txBody>
-      </p:sp>
-      <p:sp>
-        <p:nvSpPr>
-          <p:cNvPr id="11" name="Tekst — symbol zastępczy 10"/>
-          <p:cNvSpPr>
-            <a:spLocks noGrp="1"/>
-          </p:cNvSpPr>
-          <p:nvPr>
-            <p:ph type="body" idx="1"/>
-          </p:nvPr>
-        </p:nvSpPr>
-        <p:spPr/>
-        <p:txBody>
-          <a:bodyPr rtlCol="0"/>
+              <a:t>Terminy</a:t>
+            </a:r>
+          </a:p>
+        </p:txBody>
+      </p:sp>
+      <p:sp>
+        <p:nvSpPr>
+          <p:cNvPr id="3" name="pole tekstowe 2">
+            <a:extLst>
+              <a:ext uri="{FF2B5EF4-FFF2-40B4-BE49-F238E27FC236}">
+                <a16:creationId xmlns:a16="http://schemas.microsoft.com/office/drawing/2014/main" id="{37DE51F8-565C-B73C-1989-AF84E9CF892D}"/>
+              </a:ext>
+            </a:extLst>
+          </p:cNvPr>
+          <p:cNvSpPr txBox="1"/>
+          <p:nvPr/>
+        </p:nvSpPr>
+        <p:spPr>
+          <a:xfrm>
+            <a:off x="690465" y="1978089"/>
+            <a:ext cx="10257453" cy="2092881"/>
+          </a:xfrm>
+          <a:prstGeom prst="rect">
+            <a:avLst/>
+          </a:prstGeom>
+          <a:noFill/>
+        </p:spPr>
+        <p:txBody>
+          <a:bodyPr wrap="square" rtlCol="0">
+            <a:spAutoFit/>
+          </a:bodyPr>
           <a:lstStyle/>
           <a:p>
-            <a:pPr rtl="0"/>
-            <a:endParaRPr lang="pl-PL" dirty="0"/>
-          </a:p>
-        </p:txBody>
-      </p:sp>
-      <p:sp>
-        <p:nvSpPr>
-          <p:cNvPr id="12" name="Zawartość — symbol zastępczy 11"/>
-          <p:cNvSpPr>
-            <a:spLocks noGrp="1"/>
-          </p:cNvSpPr>
-          <p:nvPr>
-            <p:ph sz="half" idx="2"/>
-          </p:nvPr>
-        </p:nvSpPr>
-        <p:spPr/>
-        <p:txBody>
-          <a:bodyPr rtlCol="0"/>
-          <a:lstStyle/>
-          <a:p>
-            <a:pPr rtl="0"/>
-            <a:endParaRPr lang="pl-PL" dirty="0"/>
-          </a:p>
-        </p:txBody>
-      </p:sp>
-      <p:sp>
-        <p:nvSpPr>
-          <p:cNvPr id="13" name="Tekst — symbol zastępczy 12"/>
-          <p:cNvSpPr>
-            <a:spLocks noGrp="1"/>
-          </p:cNvSpPr>
-          <p:nvPr>
-            <p:ph type="body" sz="quarter" idx="3"/>
-          </p:nvPr>
-        </p:nvSpPr>
-        <p:spPr/>
-        <p:txBody>
-          <a:bodyPr rtlCol="0"/>
-          <a:lstStyle/>
-          <a:p>
-            <a:pPr rtl="0"/>
-            <a:endParaRPr lang="pl-PL" dirty="0"/>
-          </a:p>
-        </p:txBody>
-      </p:sp>
-      <p:sp>
-        <p:nvSpPr>
-          <p:cNvPr id="14" name="Zawartość — symbol zastępczy 13"/>
-          <p:cNvSpPr>
-            <a:spLocks noGrp="1"/>
-          </p:cNvSpPr>
-          <p:nvPr>
-            <p:ph sz="quarter" idx="4"/>
-          </p:nvPr>
-        </p:nvSpPr>
-        <p:spPr/>
-        <p:txBody>
-          <a:bodyPr rtlCol="0"/>
-          <a:lstStyle/>
-          <a:p>
-            <a:pPr rtl="0"/>
+            <a:pPr marL="342900" indent="-342900">
+              <a:buAutoNum type="arabicPeriod"/>
+            </a:pPr>
+            <a:r>
+              <a:rPr lang="pl-PL" sz="2800" dirty="0"/>
+              <a:t>Termin wdrożenia produktów projektu:	15.06.2023r.</a:t>
+            </a:r>
+          </a:p>
+          <a:p>
+            <a:pPr marL="342900" indent="-342900">
+              <a:buAutoNum type="arabicPeriod"/>
+            </a:pPr>
+            <a:endParaRPr lang="pl-PL" sz="2800" dirty="0"/>
+          </a:p>
+          <a:p>
+            <a:pPr marL="342900" indent="-342900">
+              <a:buAutoNum type="arabicPeriod"/>
+            </a:pPr>
+            <a:r>
+              <a:rPr lang="pl-PL" sz="2800" dirty="0"/>
+              <a:t>Termin realizacji korzyści:		spodziewane od lipca 2023r.</a:t>
+            </a:r>
+          </a:p>
+          <a:p>
+            <a:r>
+              <a:rPr lang="pl-PL" sz="2800" dirty="0"/>
+              <a:t>		</a:t>
+            </a:r>
+          </a:p>
+          <a:p>
+            <a:pPr marL="342900" indent="-342900">
+              <a:buAutoNum type="arabicPeriod"/>
+            </a:pPr>
             <a:endParaRPr lang="pl-PL" dirty="0"/>
           </a:p>
         </p:txBody>
@@ -10616,25 +10261,16 @@
     </p:spTree>
     <p:extLst>
       <p:ext uri="{BB962C8B-B14F-4D97-AF65-F5344CB8AC3E}">
-        <p14:creationId xmlns:p14="http://schemas.microsoft.com/office/powerpoint/2010/main" val="737118897"/>
+        <p14:creationId xmlns:p14="http://schemas.microsoft.com/office/powerpoint/2010/main" val="4129926194"/>
       </p:ext>
     </p:extLst>
   </p:cSld>
   <p:clrMapOvr>
     <a:masterClrMapping/>
   </p:clrMapOvr>
-  <mc:AlternateContent xmlns:mc="http://schemas.openxmlformats.org/markup-compatibility/2006" xmlns:p14="http://schemas.microsoft.com/office/powerpoint/2010/main">
-    <mc:Choice Requires="p14">
-      <p:transition spd="med" p14:dur="700">
-        <p:fade/>
-      </p:transition>
-    </mc:Choice>
-    <mc:Fallback xmlns="">
-      <p:transition spd="med">
-        <p:fade/>
-      </p:transition>
-    </mc:Fallback>
-  </mc:AlternateContent>
+  <p:transition spd="slow">
+    <p:push dir="u"/>
+  </p:transition>
 </p:sld>
 </file>
 
@@ -10665,41 +10301,87 @@
             <p:ph type="title"/>
           </p:nvPr>
         </p:nvSpPr>
-        <p:spPr/>
-        <p:txBody>
-          <a:bodyPr rtlCol="0"/>
+        <p:spPr>
+          <a:xfrm>
+            <a:off x="1295400" y="255134"/>
+            <a:ext cx="9601200" cy="1036850"/>
+          </a:xfrm>
+        </p:spPr>
+        <p:txBody>
+          <a:bodyPr rtlCol="0" anchor="b">
+            <a:normAutofit/>
+          </a:bodyPr>
           <a:lstStyle/>
           <a:p>
-            <a:pPr rtl="0"/>
+            <a:pPr algn="ctr" rtl="0"/>
             <a:r>
               <a:rPr lang="pl-PL" dirty="0"/>
-              <a:t>Dodaj tytuł slajdu — 4</a:t>
-            </a:r>
-          </a:p>
-        </p:txBody>
-      </p:sp>
+              <a:t>Koszty pieniężne</a:t>
+            </a:r>
+          </a:p>
+        </p:txBody>
+      </p:sp>
+      <p:pic>
+        <p:nvPicPr>
+          <p:cNvPr id="1026" name="Picture 2">
+            <a:extLst>
+              <a:ext uri="{FF2B5EF4-FFF2-40B4-BE49-F238E27FC236}">
+                <a16:creationId xmlns:a16="http://schemas.microsoft.com/office/drawing/2014/main" id="{7A1EF8E3-7D23-881D-66E2-BFB62AF76AE3}"/>
+              </a:ext>
+            </a:extLst>
+          </p:cNvPr>
+          <p:cNvPicPr>
+            <a:picLocks noGrp="1" noChangeAspect="1" noChangeArrowheads="1"/>
+          </p:cNvPicPr>
+          <p:nvPr>
+            <p:ph idx="1"/>
+          </p:nvPr>
+        </p:nvPicPr>
+        <p:blipFill rotWithShape="1">
+          <a:blip r:embed="rId3">
+            <a:extLst>
+              <a:ext uri="{28A0092B-C50C-407E-A947-70E740481C1C}">
+                <a14:useLocalDpi xmlns:a14="http://schemas.microsoft.com/office/drawing/2010/main" val="0"/>
+              </a:ext>
+            </a:extLst>
+          </a:blip>
+          <a:stretch/>
+        </p:blipFill>
+        <p:spPr bwMode="auto">
+          <a:xfrm>
+            <a:off x="2476500" y="1828800"/>
+            <a:ext cx="7239000" cy="4343400"/>
+          </a:xfrm>
+          <a:prstGeom prst="rect">
+            <a:avLst/>
+          </a:prstGeom>
+          <a:solidFill>
+            <a:srgbClr val="FFFFFF"/>
+          </a:solidFill>
+          <a:extLst>
+            <a:ext uri="{909E8E84-426E-40DD-AFC4-6F175D3DCCD1}">
+              <a14:hiddenFill xmlns:a14="http://schemas.microsoft.com/office/drawing/2010/main">
+                <a:solidFill>
+                  <a:srgbClr val="FFFFFF"/>
+                </a:solidFill>
+              </a14:hiddenFill>
+            </a:ext>
+          </a:extLst>
+        </p:spPr>
+      </p:pic>
     </p:spTree>
     <p:extLst>
       <p:ext uri="{BB962C8B-B14F-4D97-AF65-F5344CB8AC3E}">
-        <p14:creationId xmlns:p14="http://schemas.microsoft.com/office/powerpoint/2010/main" val="3061729273"/>
+        <p14:creationId xmlns:p14="http://schemas.microsoft.com/office/powerpoint/2010/main" val="188841400"/>
       </p:ext>
     </p:extLst>
   </p:cSld>
   <p:clrMapOvr>
     <a:masterClrMapping/>
   </p:clrMapOvr>
-  <mc:AlternateContent xmlns:mc="http://schemas.openxmlformats.org/markup-compatibility/2006" xmlns:p14="http://schemas.microsoft.com/office/powerpoint/2010/main">
-    <mc:Choice Requires="p14">
-      <p:transition spd="med" p14:dur="700">
-        <p:fade/>
-      </p:transition>
-    </mc:Choice>
-    <mc:Fallback xmlns="">
-      <p:transition spd="med">
-        <p:fade/>
-      </p:transition>
-    </mc:Fallback>
-  </mc:AlternateContent>
+  <p:transition spd="slow">
+    <p:push dir="u"/>
+  </p:transition>
 </p:sld>
 </file>
 
@@ -10720,28 +10402,99 @@
           <a:chExt cx="0" cy="0"/>
         </a:xfrm>
       </p:grpSpPr>
+      <p:sp>
+        <p:nvSpPr>
+          <p:cNvPr id="2" name="Tytuł 1"/>
+          <p:cNvSpPr>
+            <a:spLocks noGrp="1"/>
+          </p:cNvSpPr>
+          <p:nvPr>
+            <p:ph type="title"/>
+          </p:nvPr>
+        </p:nvSpPr>
+        <p:spPr>
+          <a:xfrm>
+            <a:off x="1295400" y="255134"/>
+            <a:ext cx="9601200" cy="1036850"/>
+          </a:xfrm>
+        </p:spPr>
+        <p:txBody>
+          <a:bodyPr rtlCol="0" anchor="b">
+            <a:normAutofit/>
+          </a:bodyPr>
+          <a:lstStyle/>
+          <a:p>
+            <a:pPr algn="ctr" rtl="0"/>
+            <a:r>
+              <a:rPr lang="pl-PL" dirty="0"/>
+              <a:t>Koszty godzinowe</a:t>
+            </a:r>
+          </a:p>
+        </p:txBody>
+      </p:sp>
+      <p:pic>
+        <p:nvPicPr>
+          <p:cNvPr id="2050" name="Picture 2">
+            <a:extLst>
+              <a:ext uri="{FF2B5EF4-FFF2-40B4-BE49-F238E27FC236}">
+                <a16:creationId xmlns:a16="http://schemas.microsoft.com/office/drawing/2014/main" id="{C803BB1E-437D-5127-6854-81CDB6E64B76}"/>
+              </a:ext>
+            </a:extLst>
+          </p:cNvPr>
+          <p:cNvPicPr>
+            <a:picLocks noGrp="1" noChangeAspect="1" noChangeArrowheads="1"/>
+          </p:cNvPicPr>
+          <p:nvPr>
+            <p:ph idx="1"/>
+          </p:nvPr>
+        </p:nvPicPr>
+        <p:blipFill>
+          <a:blip r:embed="rId3">
+            <a:extLst>
+              <a:ext uri="{28A0092B-C50C-407E-A947-70E740481C1C}">
+                <a14:useLocalDpi xmlns:a14="http://schemas.microsoft.com/office/drawing/2010/main" val="0"/>
+              </a:ext>
+            </a:extLst>
+          </a:blip>
+          <a:stretch>
+            <a:fillRect/>
+          </a:stretch>
+        </p:blipFill>
+        <p:spPr bwMode="auto">
+          <a:xfrm>
+            <a:off x="2269216" y="1828800"/>
+            <a:ext cx="7653567" cy="4343400"/>
+          </a:xfrm>
+          <a:prstGeom prst="rect">
+            <a:avLst/>
+          </a:prstGeom>
+          <a:solidFill>
+            <a:srgbClr val="FFFFFF"/>
+          </a:solidFill>
+          <a:extLst>
+            <a:ext uri="{909E8E84-426E-40DD-AFC4-6F175D3DCCD1}">
+              <a14:hiddenFill xmlns:a14="http://schemas.microsoft.com/office/drawing/2010/main">
+                <a:solidFill>
+                  <a:srgbClr val="FFFFFF"/>
+                </a:solidFill>
+              </a14:hiddenFill>
+            </a:ext>
+          </a:extLst>
+        </p:spPr>
+      </p:pic>
     </p:spTree>
     <p:extLst>
       <p:ext uri="{BB962C8B-B14F-4D97-AF65-F5344CB8AC3E}">
-        <p14:creationId xmlns:p14="http://schemas.microsoft.com/office/powerpoint/2010/main" val="1455343978"/>
+        <p14:creationId xmlns:p14="http://schemas.microsoft.com/office/powerpoint/2010/main" val="3284682075"/>
       </p:ext>
     </p:extLst>
   </p:cSld>
   <p:clrMapOvr>
     <a:masterClrMapping/>
   </p:clrMapOvr>
-  <mc:AlternateContent xmlns:mc="http://schemas.openxmlformats.org/markup-compatibility/2006" xmlns:p14="http://schemas.microsoft.com/office/powerpoint/2010/main">
-    <mc:Choice Requires="p14">
-      <p:transition spd="med" p14:dur="700">
-        <p:fade/>
-      </p:transition>
-    </mc:Choice>
-    <mc:Fallback xmlns="">
-      <p:transition spd="med">
-        <p:fade/>
-      </p:transition>
-    </mc:Fallback>
-  </mc:AlternateContent>
+  <p:transition spd="slow">
+    <p:cover/>
+  </p:transition>
 </p:sld>
 </file>
 

</xml_diff>